<commit_message>
Updated link on frontpage
</commit_message>
<xml_diff>
--- a/Presentation.pptx
+++ b/Presentation.pptx
@@ -8487,15 +8487,7 @@
           <a:p>
             <a:r>
               <a:rPr lang="en-US" dirty="0" smtClean="0"/>
-              <a:t>To </a:t>
-            </a:r>
-            <a:r>
-              <a:rPr lang="en-US" dirty="0" smtClean="0"/>
-              <a:t>unify and simplify </a:t>
-            </a:r>
-            <a:r>
-              <a:rPr lang="en-US" dirty="0" smtClean="0"/>
-              <a:t>how design assets are managed and hosted.</a:t>
+              <a:t>To unify and simplify how design assets are managed and hosted.</a:t>
             </a:r>
             <a:endParaRPr lang="en-US" dirty="0"/>
           </a:p>
@@ -8511,8 +8503,8 @@
         </p:nvSpPr>
         <p:spPr>
           <a:xfrm>
-            <a:off x="0" y="6483723"/>
-            <a:ext cx="4038600" cy="748553"/>
+            <a:off x="-1" y="6290555"/>
+            <a:ext cx="5442857" cy="567445"/>
           </a:xfrm>
           <a:prstGeom prst="rect">
             <a:avLst/>
@@ -8739,13 +8731,91 @@
               <a:t> to create this </a:t>
             </a:r>
             <a:r>
-              <a:rPr lang="en-US" dirty="0" err="1" smtClean="0"/>
-              <a:t>powerpoint</a:t>
-            </a:r>
-            <a:r>
               <a:rPr lang="en-US" dirty="0" smtClean="0"/>
-              <a:t>!</a:t>
-            </a:r>
+              <a:t>presentation!</a:t>
+            </a:r>
+          </a:p>
+          <a:p>
+            <a:r>
+              <a:rPr lang="en-US" dirty="0"/>
+              <a:t>https://</a:t>
+            </a:r>
+            <a:r>
+              <a:rPr lang="en-US" dirty="0" err="1"/>
+              <a:t>github.com</a:t>
+            </a:r>
+            <a:r>
+              <a:rPr lang="en-US" dirty="0"/>
+              <a:t>/</a:t>
+            </a:r>
+            <a:r>
+              <a:rPr lang="en-US" dirty="0" err="1"/>
+              <a:t>RyanCopley</a:t>
+            </a:r>
+            <a:r>
+              <a:rPr lang="en-US" dirty="0"/>
+              <a:t>/</a:t>
+            </a:r>
+            <a:r>
+              <a:rPr lang="en-US" dirty="0" err="1"/>
+              <a:t>git</a:t>
+            </a:r>
+            <a:r>
+              <a:rPr lang="en-US" dirty="0"/>
+              <a:t>-for-designers</a:t>
+            </a:r>
+            <a:endParaRPr lang="en-US" dirty="0"/>
+          </a:p>
+        </p:txBody>
+      </p:sp>
+      <p:sp>
+        <p:nvSpPr>
+          <p:cNvPr id="5" name="TextBox 4"/>
+          <p:cNvSpPr txBox="1"/>
+          <p:nvPr/>
+        </p:nvSpPr>
+        <p:spPr>
+          <a:xfrm>
+            <a:off x="2875643" y="6758214"/>
+            <a:ext cx="184666" cy="369332"/>
+          </a:xfrm>
+          <a:prstGeom prst="rect">
+            <a:avLst/>
+          </a:prstGeom>
+          <a:noFill/>
+        </p:spPr>
+        <p:txBody>
+          <a:bodyPr wrap="none" rtlCol="0">
+            <a:spAutoFit/>
+          </a:bodyPr>
+          <a:lstStyle/>
+          <a:p>
+            <a:endParaRPr lang="en-US" dirty="0"/>
+          </a:p>
+        </p:txBody>
+      </p:sp>
+      <p:sp>
+        <p:nvSpPr>
+          <p:cNvPr id="6" name="TextBox 5"/>
+          <p:cNvSpPr txBox="1"/>
+          <p:nvPr/>
+        </p:nvSpPr>
+        <p:spPr>
+          <a:xfrm>
+            <a:off x="2657929" y="7003143"/>
+            <a:ext cx="184666" cy="369332"/>
+          </a:xfrm>
+          <a:prstGeom prst="rect">
+            <a:avLst/>
+          </a:prstGeom>
+          <a:noFill/>
+        </p:spPr>
+        <p:txBody>
+          <a:bodyPr wrap="none" rtlCol="0">
+            <a:spAutoFit/>
+          </a:bodyPr>
+          <a:lstStyle/>
+          <a:p>
             <a:endParaRPr lang="en-US" dirty="0"/>
           </a:p>
         </p:txBody>
@@ -8852,8 +8922,23 @@
               <a:rPr lang="en-US" b="1" dirty="0" smtClean="0">
                 <a:sym typeface="Wingdings"/>
               </a:rPr>
-              <a:t></a:t>
-            </a:r>
+              <a:t> This is just an exercise to understand </a:t>
+            </a:r>
+            <a:r>
+              <a:rPr lang="en-US" b="1" dirty="0" err="1" smtClean="0">
+                <a:sym typeface="Wingdings"/>
+              </a:rPr>
+              <a:t>git</a:t>
+            </a:r>
+            <a:r>
+              <a:rPr lang="en-US" b="1" dirty="0" smtClean="0">
+                <a:sym typeface="Wingdings"/>
+              </a:rPr>
+              <a:t>.</a:t>
+            </a:r>
+            <a:endParaRPr lang="en-US" b="1" dirty="0" smtClean="0">
+              <a:sym typeface="Wingdings"/>
+            </a:endParaRPr>
           </a:p>
           <a:p>
             <a:r>
@@ -8888,7 +8973,11 @@
             </a:r>
             <a:r>
               <a:rPr lang="en-US" dirty="0" smtClean="0"/>
-              <a:t> please let me know)</a:t>
+              <a:t> please let me know</a:t>
+            </a:r>
+            <a:r>
+              <a:rPr lang="en-US" dirty="0" smtClean="0"/>
+              <a:t>)</a:t>
             </a:r>
             <a:endParaRPr lang="en-US" dirty="0"/>
           </a:p>

</xml_diff>

<commit_message>
Updated how this helps designers
</commit_message>
<xml_diff>
--- a/Presentation.pptx
+++ b/Presentation.pptx
@@ -8768,58 +8768,6 @@
           </a:p>
         </p:txBody>
       </p:sp>
-      <p:sp>
-        <p:nvSpPr>
-          <p:cNvPr id="5" name="TextBox 4"/>
-          <p:cNvSpPr txBox="1"/>
-          <p:nvPr/>
-        </p:nvSpPr>
-        <p:spPr>
-          <a:xfrm>
-            <a:off x="2875643" y="6758214"/>
-            <a:ext cx="184666" cy="369332"/>
-          </a:xfrm>
-          <a:prstGeom prst="rect">
-            <a:avLst/>
-          </a:prstGeom>
-          <a:noFill/>
-        </p:spPr>
-        <p:txBody>
-          <a:bodyPr wrap="none" rtlCol="0">
-            <a:spAutoFit/>
-          </a:bodyPr>
-          <a:lstStyle/>
-          <a:p>
-            <a:endParaRPr lang="en-US" dirty="0"/>
-          </a:p>
-        </p:txBody>
-      </p:sp>
-      <p:sp>
-        <p:nvSpPr>
-          <p:cNvPr id="6" name="TextBox 5"/>
-          <p:cNvSpPr txBox="1"/>
-          <p:nvPr/>
-        </p:nvSpPr>
-        <p:spPr>
-          <a:xfrm>
-            <a:off x="2657929" y="7003143"/>
-            <a:ext cx="184666" cy="369332"/>
-          </a:xfrm>
-          <a:prstGeom prst="rect">
-            <a:avLst/>
-          </a:prstGeom>
-          <a:noFill/>
-        </p:spPr>
-        <p:txBody>
-          <a:bodyPr wrap="none" rtlCol="0">
-            <a:spAutoFit/>
-          </a:bodyPr>
-          <a:lstStyle/>
-          <a:p>
-            <a:endParaRPr lang="en-US" dirty="0"/>
-          </a:p>
-        </p:txBody>
-      </p:sp>
     </p:spTree>
     <p:extLst>
       <p:ext uri="{BB962C8B-B14F-4D97-AF65-F5344CB8AC3E}">
@@ -9433,8 +9381,19 @@
             <a:pPr lvl="1"/>
             <a:r>
               <a:rPr lang="en-US" dirty="0" smtClean="0"/>
-              <a:t>(Sort of, but trust me, it’s awesome)</a:t>
-            </a:r>
+              <a:t>(Sort of, but trust me, it’s awesome</a:t>
+            </a:r>
+            <a:r>
+              <a:rPr lang="en-US" dirty="0" smtClean="0"/>
+              <a:t>)</a:t>
+            </a:r>
+          </a:p>
+          <a:p>
+            <a:r>
+              <a:rPr lang="en-US" dirty="0" smtClean="0"/>
+              <a:t>Branching</a:t>
+            </a:r>
+            <a:endParaRPr lang="en-US" dirty="0" smtClean="0"/>
           </a:p>
           <a:p>
             <a:r>
@@ -9551,7 +9510,7 @@
         <p:spPr/>
         <p:txBody>
           <a:bodyPr>
-            <a:normAutofit/>
+            <a:normAutofit fontScale="92500" lnSpcReduction="20000"/>
           </a:bodyPr>
           <a:lstStyle/>
           <a:p>
@@ -9591,6 +9550,14 @@
             <a:endParaRPr lang="en-US" dirty="0" smtClean="0"/>
           </a:p>
           <a:p>
+            <a:pPr lvl="1"/>
+            <a:r>
+              <a:rPr lang="en-US" dirty="0" smtClean="0"/>
+              <a:t>You can’t see “inside” a zip unless you download and extract it</a:t>
+            </a:r>
+            <a:endParaRPr lang="en-US" dirty="0" smtClean="0"/>
+          </a:p>
+          <a:p>
             <a:r>
               <a:rPr lang="en-US" dirty="0" smtClean="0"/>
               <a:t>There are file ownership issues with </a:t>
@@ -9598,6 +9565,28 @@
             <a:r>
               <a:rPr lang="en-US" dirty="0" err="1" smtClean="0"/>
               <a:t>DropBox</a:t>
+            </a:r>
+            <a:endParaRPr lang="en-US" dirty="0" smtClean="0"/>
+          </a:p>
+          <a:p>
+            <a:pPr lvl="1"/>
+            <a:r>
+              <a:rPr lang="en-US" dirty="0" smtClean="0"/>
+              <a:t>We can’t see inside your </a:t>
+            </a:r>
+            <a:r>
+              <a:rPr lang="en-US" dirty="0" err="1" smtClean="0"/>
+              <a:t>dropbox</a:t>
+            </a:r>
+            <a:r>
+              <a:rPr lang="en-US" dirty="0" smtClean="0"/>
+              <a:t> easily </a:t>
+            </a:r>
+            <a:r>
+              <a:rPr lang="en-US" dirty="0" smtClean="0">
+                <a:sym typeface="Wingdings"/>
+              </a:rPr>
+              <a:t> </a:t>
             </a:r>
             <a:endParaRPr lang="en-US" dirty="0" smtClean="0"/>
           </a:p>

</xml_diff>

<commit_message>
Secret Message? What could that be for?
</commit_message>
<xml_diff>
--- a/Presentation.pptx
+++ b/Presentation.pptx
@@ -5,16 +5,17 @@
     <p:sldMasterId id="2147483990" r:id="rId1"/>
   </p:sldMasterIdLst>
   <p:sldIdLst>
-    <p:sldId id="256" r:id="rId2"/>
-    <p:sldId id="257" r:id="rId3"/>
-    <p:sldId id="258" r:id="rId4"/>
-    <p:sldId id="259" r:id="rId5"/>
-    <p:sldId id="261" r:id="rId6"/>
-    <p:sldId id="264" r:id="rId7"/>
-    <p:sldId id="265" r:id="rId8"/>
-    <p:sldId id="262" r:id="rId9"/>
-    <p:sldId id="263" r:id="rId10"/>
-    <p:sldId id="260" r:id="rId11"/>
+    <p:sldId id="266" r:id="rId2"/>
+    <p:sldId id="256" r:id="rId3"/>
+    <p:sldId id="257" r:id="rId4"/>
+    <p:sldId id="258" r:id="rId5"/>
+    <p:sldId id="259" r:id="rId6"/>
+    <p:sldId id="261" r:id="rId7"/>
+    <p:sldId id="264" r:id="rId8"/>
+    <p:sldId id="265" r:id="rId9"/>
+    <p:sldId id="262" r:id="rId10"/>
+    <p:sldId id="263" r:id="rId11"/>
+    <p:sldId id="260" r:id="rId12"/>
   </p:sldIdLst>
   <p:sldSz cx="9144000" cy="6858000" type="screen4x3"/>
   <p:notesSz cx="6858000" cy="9144000"/>
@@ -8431,338 +8432,46 @@
             <a:spLocks noGrp="1"/>
           </p:cNvSpPr>
           <p:nvPr>
-            <p:ph type="ctrTitle"/>
+            <p:ph type="title"/>
           </p:nvPr>
         </p:nvSpPr>
         <p:spPr/>
         <p:txBody>
-          <a:bodyPr>
-            <a:normAutofit fontScale="90000"/>
-          </a:bodyPr>
-          <a:lstStyle/>
-          <a:p>
-            <a:r>
-              <a:rPr lang="en-US" dirty="0" err="1" smtClean="0"/>
-              <a:t>Git</a:t>
-            </a:r>
+          <a:bodyPr/>
+          <a:lstStyle/>
+          <a:p>
             <a:r>
               <a:rPr lang="en-US" dirty="0" smtClean="0"/>
-              <a:t> &amp; </a:t>
-            </a:r>
-            <a:r>
-              <a:rPr lang="en-US" dirty="0" err="1" smtClean="0"/>
-              <a:t>GitHub</a:t>
-            </a:r>
+              <a:t>SECRET MESSAGE</a:t>
+            </a:r>
+            <a:endParaRPr lang="en-US" dirty="0"/>
+          </a:p>
+        </p:txBody>
+      </p:sp>
+      <p:sp>
+        <p:nvSpPr>
+          <p:cNvPr id="3" name="Content Placeholder 2"/>
+          <p:cNvSpPr>
+            <a:spLocks noGrp="1"/>
+          </p:cNvSpPr>
+          <p:nvPr>
+            <p:ph idx="1"/>
+          </p:nvPr>
+        </p:nvSpPr>
+        <p:spPr/>
+        <p:txBody>
+          <a:bodyPr/>
+          <a:lstStyle/>
+          <a:p>
             <a:r>
               <a:rPr lang="en-US" dirty="0" smtClean="0"/>
-              <a:t> For Design</a:t>
-            </a:r>
-            <a:br>
-              <a:rPr lang="en-US" dirty="0" smtClean="0"/>
-            </a:br>
-            <a:r>
-              <a:rPr lang="en-US" sz="900" dirty="0" smtClean="0"/>
-              <a:t>(and some other people)</a:t>
-            </a:r>
-            <a:endParaRPr lang="en-US" sz="900" dirty="0"/>
-          </a:p>
-        </p:txBody>
-      </p:sp>
-      <p:sp>
-        <p:nvSpPr>
-          <p:cNvPr id="3" name="Subtitle 2"/>
-          <p:cNvSpPr>
-            <a:spLocks noGrp="1"/>
-          </p:cNvSpPr>
-          <p:nvPr>
-            <p:ph type="subTitle" idx="1"/>
-          </p:nvPr>
-        </p:nvSpPr>
-        <p:spPr/>
-        <p:txBody>
-          <a:bodyPr>
-            <a:normAutofit/>
-          </a:bodyPr>
-          <a:lstStyle/>
-          <a:p>
-            <a:r>
-              <a:rPr lang="en-US" dirty="0" smtClean="0"/>
-              <a:t>To unify and simplify how design assets are managed and hosted.</a:t>
-            </a:r>
-            <a:endParaRPr lang="en-US" dirty="0"/>
-          </a:p>
-        </p:txBody>
-      </p:sp>
-      <p:sp>
-        <p:nvSpPr>
-          <p:cNvPr id="4" name="Subtitle 2"/>
-          <p:cNvSpPr txBox="1">
-            <a:spLocks/>
-          </p:cNvSpPr>
-          <p:nvPr/>
-        </p:nvSpPr>
-        <p:spPr>
-          <a:xfrm>
-            <a:off x="-1" y="6290555"/>
-            <a:ext cx="5442857" cy="567445"/>
-          </a:xfrm>
-          <a:prstGeom prst="rect">
-            <a:avLst/>
-          </a:prstGeom>
-        </p:spPr>
-        <p:txBody>
-          <a:bodyPr vert="horz" lIns="91440" tIns="45720" rIns="91440" bIns="45720" rtlCol="0">
-            <a:normAutofit/>
-          </a:bodyPr>
-          <a:lstStyle>
-            <a:lvl1pPr marL="0" indent="0" algn="l" defTabSz="914400" rtl="0" eaLnBrk="1" latinLnBrk="0" hangingPunct="1">
-              <a:spcBef>
-                <a:spcPts val="300"/>
-              </a:spcBef>
-              <a:buClr>
-                <a:schemeClr val="accent1"/>
-              </a:buClr>
-              <a:buSzPct val="75000"/>
-              <a:buFont typeface="Wingdings" pitchFamily="2" charset="2"/>
-              <a:buNone/>
-              <a:defRPr sz="1400" kern="1200">
-                <a:solidFill>
-                  <a:schemeClr val="tx1">
-                    <a:tint val="75000"/>
-                  </a:schemeClr>
-                </a:solidFill>
-                <a:latin typeface="+mn-lt"/>
-                <a:ea typeface="+mn-ea"/>
-                <a:cs typeface="+mn-cs"/>
-              </a:defRPr>
-            </a:lvl1pPr>
-            <a:lvl2pPr marL="457200" indent="0" algn="ctr" defTabSz="914400" rtl="0" eaLnBrk="1" latinLnBrk="0" hangingPunct="1">
-              <a:spcBef>
-                <a:spcPts val="600"/>
-              </a:spcBef>
-              <a:buClr>
-                <a:schemeClr val="accent1">
-                  <a:lumMod val="60000"/>
-                  <a:lumOff val="40000"/>
-                </a:schemeClr>
-              </a:buClr>
-              <a:buSzPct val="75000"/>
-              <a:buFont typeface="Wingdings" pitchFamily="2" charset="2"/>
-              <a:buNone/>
-              <a:defRPr sz="1800" kern="1200">
-                <a:solidFill>
-                  <a:schemeClr val="tx1">
-                    <a:tint val="75000"/>
-                  </a:schemeClr>
-                </a:solidFill>
-                <a:latin typeface="+mn-lt"/>
-                <a:ea typeface="+mn-ea"/>
-                <a:cs typeface="+mn-cs"/>
-              </a:defRPr>
-            </a:lvl2pPr>
-            <a:lvl3pPr marL="914400" indent="0" algn="ctr" defTabSz="914400" rtl="0" eaLnBrk="1" latinLnBrk="0" hangingPunct="1">
-              <a:spcBef>
-                <a:spcPts val="600"/>
-              </a:spcBef>
-              <a:buClr>
-                <a:schemeClr val="accent1"/>
-              </a:buClr>
-              <a:buSzPct val="75000"/>
-              <a:buFont typeface="Wingdings" pitchFamily="2" charset="2"/>
-              <a:buNone/>
-              <a:defRPr sz="1800" kern="1200">
-                <a:solidFill>
-                  <a:schemeClr val="tx1">
-                    <a:tint val="75000"/>
-                  </a:schemeClr>
-                </a:solidFill>
-                <a:latin typeface="+mn-lt"/>
-                <a:ea typeface="+mn-ea"/>
-                <a:cs typeface="+mn-cs"/>
-              </a:defRPr>
-            </a:lvl3pPr>
-            <a:lvl4pPr marL="1371600" indent="0" algn="ctr" defTabSz="914400" rtl="0" eaLnBrk="1" latinLnBrk="0" hangingPunct="1">
-              <a:spcBef>
-                <a:spcPts val="600"/>
-              </a:spcBef>
-              <a:buClr>
-                <a:schemeClr val="accent1">
-                  <a:lumMod val="60000"/>
-                  <a:lumOff val="40000"/>
-                </a:schemeClr>
-              </a:buClr>
-              <a:buSzPct val="75000"/>
-              <a:buFont typeface="Wingdings" pitchFamily="2" charset="2"/>
-              <a:buNone/>
-              <a:defRPr sz="1800" kern="1200">
-                <a:solidFill>
-                  <a:schemeClr val="tx1">
-                    <a:tint val="75000"/>
-                  </a:schemeClr>
-                </a:solidFill>
-                <a:latin typeface="+mn-lt"/>
-                <a:ea typeface="+mn-ea"/>
-                <a:cs typeface="+mn-cs"/>
-              </a:defRPr>
-            </a:lvl4pPr>
-            <a:lvl5pPr marL="1828800" indent="0" algn="ctr" defTabSz="914400" rtl="0" eaLnBrk="1" latinLnBrk="0" hangingPunct="1">
-              <a:spcBef>
-                <a:spcPts val="600"/>
-              </a:spcBef>
-              <a:buClr>
-                <a:schemeClr val="accent1"/>
-              </a:buClr>
-              <a:buSzPct val="75000"/>
-              <a:buFont typeface="Wingdings" pitchFamily="2" charset="2"/>
-              <a:buNone/>
-              <a:defRPr sz="1800" kern="1200">
-                <a:solidFill>
-                  <a:schemeClr val="tx1">
-                    <a:tint val="75000"/>
-                  </a:schemeClr>
-                </a:solidFill>
-                <a:latin typeface="+mn-lt"/>
-                <a:ea typeface="+mn-ea"/>
-                <a:cs typeface="+mn-cs"/>
-              </a:defRPr>
-            </a:lvl5pPr>
-            <a:lvl6pPr marL="2286000" indent="0" algn="ctr" defTabSz="914400" rtl="0" eaLnBrk="1" latinLnBrk="0" hangingPunct="1">
-              <a:spcBef>
-                <a:spcPct val="20000"/>
-              </a:spcBef>
-              <a:buClr>
-                <a:schemeClr val="accent1">
-                  <a:lumMod val="60000"/>
-                  <a:lumOff val="40000"/>
-                </a:schemeClr>
-              </a:buClr>
-              <a:buSzPct val="75000"/>
-              <a:buFont typeface="Wingdings" pitchFamily="2" charset="2"/>
-              <a:buNone/>
-              <a:defRPr lang="en-US" sz="1800" kern="1200">
-                <a:solidFill>
-                  <a:schemeClr val="tx1">
-                    <a:tint val="75000"/>
-                  </a:schemeClr>
-                </a:solidFill>
-                <a:latin typeface="+mn-lt"/>
-                <a:ea typeface="+mn-ea"/>
-                <a:cs typeface="+mn-cs"/>
-              </a:defRPr>
-            </a:lvl6pPr>
-            <a:lvl7pPr marL="2743200" indent="0" algn="ctr" defTabSz="914400" rtl="0" eaLnBrk="1" latinLnBrk="0" hangingPunct="1">
-              <a:spcBef>
-                <a:spcPct val="20000"/>
-              </a:spcBef>
-              <a:buClr>
-                <a:schemeClr val="accent1"/>
-              </a:buClr>
-              <a:buSzPct val="75000"/>
-              <a:buFont typeface="Wingdings" pitchFamily="2" charset="2"/>
-              <a:buNone/>
-              <a:defRPr lang="en-US" sz="1800" kern="1200" baseline="0">
-                <a:solidFill>
-                  <a:schemeClr val="tx1">
-                    <a:tint val="75000"/>
-                  </a:schemeClr>
-                </a:solidFill>
-                <a:latin typeface="+mn-lt"/>
-                <a:ea typeface="+mn-ea"/>
-                <a:cs typeface="+mn-cs"/>
-              </a:defRPr>
-            </a:lvl7pPr>
-            <a:lvl8pPr marL="3200400" indent="0" algn="ctr" defTabSz="914400" rtl="0" eaLnBrk="1" latinLnBrk="0" hangingPunct="1">
-              <a:spcBef>
-                <a:spcPct val="20000"/>
-              </a:spcBef>
-              <a:buClr>
-                <a:schemeClr val="accent1">
-                  <a:lumMod val="60000"/>
-                  <a:lumOff val="40000"/>
-                </a:schemeClr>
-              </a:buClr>
-              <a:buSzPct val="75000"/>
-              <a:buFont typeface="Wingdings" pitchFamily="2" charset="2"/>
-              <a:buNone/>
-              <a:defRPr lang="en-US" sz="1800" kern="1200" baseline="0">
-                <a:solidFill>
-                  <a:schemeClr val="tx1">
-                    <a:tint val="75000"/>
-                  </a:schemeClr>
-                </a:solidFill>
-                <a:latin typeface="+mn-lt"/>
-                <a:ea typeface="+mn-ea"/>
-                <a:cs typeface="+mn-cs"/>
-              </a:defRPr>
-            </a:lvl8pPr>
-            <a:lvl9pPr marL="3657600" indent="0" algn="ctr" defTabSz="914400" rtl="0" eaLnBrk="1" latinLnBrk="0" hangingPunct="1">
-              <a:spcBef>
-                <a:spcPct val="20000"/>
-              </a:spcBef>
-              <a:buClr>
-                <a:schemeClr val="accent1"/>
-              </a:buClr>
-              <a:buSzPct val="75000"/>
-              <a:buFont typeface="Wingdings" pitchFamily="2" charset="2"/>
-              <a:buNone/>
-              <a:defRPr lang="en-US" sz="1800" kern="1200" baseline="0">
-                <a:solidFill>
-                  <a:schemeClr val="tx1">
-                    <a:tint val="75000"/>
-                  </a:schemeClr>
-                </a:solidFill>
-                <a:latin typeface="+mn-lt"/>
-                <a:ea typeface="+mn-ea"/>
-                <a:cs typeface="+mn-cs"/>
-              </a:defRPr>
-            </a:lvl9pPr>
-          </a:lstStyle>
-          <a:p>
-            <a:r>
-              <a:rPr lang="en-US" dirty="0" smtClean="0"/>
-              <a:t>I even used </a:t>
-            </a:r>
-            <a:r>
-              <a:rPr lang="en-US" dirty="0" err="1" smtClean="0"/>
-              <a:t>git</a:t>
-            </a:r>
-            <a:r>
-              <a:rPr lang="en-US" dirty="0" smtClean="0"/>
-              <a:t> to create this </a:t>
-            </a:r>
-            <a:r>
-              <a:rPr lang="en-US" dirty="0" smtClean="0"/>
-              <a:t>presentation!</a:t>
-            </a:r>
-          </a:p>
-          <a:p>
-            <a:r>
-              <a:rPr lang="en-US" dirty="0"/>
-              <a:t>https://</a:t>
-            </a:r>
-            <a:r>
-              <a:rPr lang="en-US" dirty="0" err="1"/>
-              <a:t>github.com</a:t>
-            </a:r>
-            <a:r>
-              <a:rPr lang="en-US" dirty="0"/>
-              <a:t>/</a:t>
-            </a:r>
-            <a:r>
-              <a:rPr lang="en-US" dirty="0" err="1"/>
-              <a:t>RyanCopley</a:t>
-            </a:r>
-            <a:r>
-              <a:rPr lang="en-US" dirty="0"/>
-              <a:t>/</a:t>
-            </a:r>
-            <a:r>
-              <a:rPr lang="en-US" dirty="0" err="1"/>
-              <a:t>git</a:t>
-            </a:r>
-            <a:r>
-              <a:rPr lang="en-US" dirty="0"/>
-              <a:t>-for-designers</a:t>
+              <a:t>Be the first to show this to Ryan to win a prize </a:t>
+            </a:r>
+            <a:r>
+              <a:rPr lang="en-US" dirty="0" smtClean="0">
+                <a:sym typeface="Wingdings"/>
+              </a:rPr>
+              <a:t> </a:t>
             </a:r>
             <a:endParaRPr lang="en-US" dirty="0"/>
           </a:p>
@@ -8771,7 +8480,7 @@
     </p:spTree>
     <p:extLst>
       <p:ext uri="{BB962C8B-B14F-4D97-AF65-F5344CB8AC3E}">
-        <p14:creationId xmlns:p14="http://schemas.microsoft.com/office/powerpoint/2010/main" val="770392377"/>
+        <p14:creationId xmlns:p14="http://schemas.microsoft.com/office/powerpoint/2010/main" val="3675867592"/>
       </p:ext>
     </p:extLst>
   </p:cSld>
@@ -8782,6 +8491,267 @@
 </file>
 
 <file path=ppt/slides/slide10.xml><?xml version="1.0" encoding="utf-8"?>
+<p:sld xmlns:a="http://schemas.openxmlformats.org/drawingml/2006/main" xmlns:r="http://schemas.openxmlformats.org/officeDocument/2006/relationships" xmlns:p="http://schemas.openxmlformats.org/presentationml/2006/main">
+  <p:cSld>
+    <p:spTree>
+      <p:nvGrpSpPr>
+        <p:cNvPr id="1" name=""/>
+        <p:cNvGrpSpPr/>
+        <p:nvPr/>
+      </p:nvGrpSpPr>
+      <p:grpSpPr>
+        <a:xfrm>
+          <a:off x="0" y="0"/>
+          <a:ext cx="0" cy="0"/>
+          <a:chOff x="0" y="0"/>
+          <a:chExt cx="0" cy="0"/>
+        </a:xfrm>
+      </p:grpSpPr>
+      <p:sp>
+        <p:nvSpPr>
+          <p:cNvPr id="2" name="Title 1"/>
+          <p:cNvSpPr>
+            <a:spLocks noGrp="1"/>
+          </p:cNvSpPr>
+          <p:nvPr>
+            <p:ph type="title"/>
+          </p:nvPr>
+        </p:nvSpPr>
+        <p:spPr/>
+        <p:txBody>
+          <a:bodyPr/>
+          <a:lstStyle/>
+          <a:p>
+            <a:r>
+              <a:rPr lang="en-US" dirty="0" smtClean="0"/>
+              <a:t>Real world example of branching</a:t>
+            </a:r>
+            <a:endParaRPr lang="en-US" dirty="0"/>
+          </a:p>
+        </p:txBody>
+      </p:sp>
+      <p:sp>
+        <p:nvSpPr>
+          <p:cNvPr id="3" name="Content Placeholder 2"/>
+          <p:cNvSpPr>
+            <a:spLocks noGrp="1"/>
+          </p:cNvSpPr>
+          <p:nvPr>
+            <p:ph idx="1"/>
+          </p:nvPr>
+        </p:nvSpPr>
+        <p:spPr/>
+        <p:txBody>
+          <a:bodyPr>
+            <a:normAutofit/>
+          </a:bodyPr>
+          <a:lstStyle/>
+          <a:p>
+            <a:pPr lvl="1"/>
+            <a:r>
+              <a:rPr lang="en-US" dirty="0" smtClean="0"/>
+              <a:t>Context: We have a splash screen which is currently </a:t>
+            </a:r>
+            <a:r>
+              <a:rPr lang="en-US" dirty="0" smtClean="0">
+                <a:solidFill>
+                  <a:srgbClr val="FF0000"/>
+                </a:solidFill>
+              </a:rPr>
+              <a:t>RED</a:t>
+            </a:r>
+            <a:r>
+              <a:rPr lang="en-US" dirty="0" smtClean="0"/>
+              <a:t>, and has been approved and is in the master repo.</a:t>
+            </a:r>
+          </a:p>
+          <a:p>
+            <a:pPr lvl="1"/>
+            <a:r>
+              <a:rPr lang="en-US" dirty="0" smtClean="0"/>
+              <a:t>PM</a:t>
+            </a:r>
+            <a:r>
+              <a:rPr lang="en-US" dirty="0"/>
+              <a:t>: “I know you made a red splash screen, but I want to see orange and brown to see if they’re better. Can you do both and let me see?”</a:t>
+            </a:r>
+          </a:p>
+          <a:p>
+            <a:pPr lvl="1"/>
+            <a:r>
+              <a:rPr lang="en-US" dirty="0"/>
+              <a:t>Two branches, an </a:t>
+            </a:r>
+            <a:r>
+              <a:rPr lang="en-US" dirty="0">
+                <a:solidFill>
+                  <a:srgbClr val="FF6600"/>
+                </a:solidFill>
+              </a:rPr>
+              <a:t>ORANGE</a:t>
+            </a:r>
+            <a:r>
+              <a:rPr lang="en-US" dirty="0"/>
+              <a:t> branch, and a </a:t>
+            </a:r>
+            <a:r>
+              <a:rPr lang="en-US" dirty="0">
+                <a:solidFill>
+                  <a:srgbClr val="996633"/>
+                </a:solidFill>
+              </a:rPr>
+              <a:t>BROWN</a:t>
+            </a:r>
+            <a:r>
+              <a:rPr lang="en-US" dirty="0"/>
+              <a:t> branch, which are parents of </a:t>
+            </a:r>
+            <a:r>
+              <a:rPr lang="en-US" dirty="0" smtClean="0">
+                <a:solidFill>
+                  <a:srgbClr val="FF0000"/>
+                </a:solidFill>
+              </a:rPr>
+              <a:t>RED</a:t>
+            </a:r>
+            <a:r>
+              <a:rPr lang="en-US" dirty="0" smtClean="0"/>
+              <a:t>, which has already been approved (master)</a:t>
+            </a:r>
+          </a:p>
+          <a:p>
+            <a:pPr lvl="1"/>
+            <a:r>
+              <a:rPr lang="en-US" dirty="0" smtClean="0"/>
+              <a:t>You do the work…         Show the PM…</a:t>
+            </a:r>
+          </a:p>
+          <a:p>
+            <a:pPr lvl="1"/>
+            <a:r>
+              <a:rPr lang="en-US" dirty="0" smtClean="0"/>
+              <a:t>PM: “I think I like </a:t>
+            </a:r>
+            <a:r>
+              <a:rPr lang="en-US" dirty="0" smtClean="0">
+                <a:solidFill>
+                  <a:srgbClr val="996633"/>
+                </a:solidFill>
+              </a:rPr>
+              <a:t>BROWN</a:t>
+            </a:r>
+            <a:r>
+              <a:rPr lang="en-US" dirty="0" smtClean="0"/>
+              <a:t>, lets use that one”</a:t>
+            </a:r>
+          </a:p>
+          <a:p>
+            <a:pPr lvl="1"/>
+            <a:r>
+              <a:rPr lang="en-US" dirty="0" smtClean="0">
+                <a:solidFill>
+                  <a:srgbClr val="996633"/>
+                </a:solidFill>
+              </a:rPr>
+              <a:t>BROWN</a:t>
+            </a:r>
+            <a:r>
+              <a:rPr lang="en-US" dirty="0" smtClean="0"/>
+              <a:t> would then be merged (By management) into the (</a:t>
+            </a:r>
+            <a:r>
+              <a:rPr lang="en-US" dirty="0" smtClean="0">
+                <a:solidFill>
+                  <a:srgbClr val="FF0000"/>
+                </a:solidFill>
+              </a:rPr>
+              <a:t>RED</a:t>
+            </a:r>
+            <a:r>
+              <a:rPr lang="en-US" dirty="0" smtClean="0"/>
+              <a:t>) master repo, signaling approval. </a:t>
+            </a:r>
+          </a:p>
+          <a:p>
+            <a:pPr lvl="1"/>
+            <a:r>
+              <a:rPr lang="en-US" dirty="0" smtClean="0">
+                <a:solidFill>
+                  <a:srgbClr val="996633"/>
+                </a:solidFill>
+              </a:rPr>
+              <a:t>BROWN</a:t>
+            </a:r>
+            <a:r>
+              <a:rPr lang="en-US" dirty="0" smtClean="0"/>
+              <a:t> and </a:t>
+            </a:r>
+            <a:r>
+              <a:rPr lang="en-US" dirty="0" smtClean="0">
+                <a:solidFill>
+                  <a:srgbClr val="FF6600"/>
+                </a:solidFill>
+              </a:rPr>
+              <a:t>ORANGE</a:t>
+            </a:r>
+            <a:r>
+              <a:rPr lang="en-US" dirty="0" smtClean="0"/>
+              <a:t> branches could be deleted once the work is approved. (Optional)</a:t>
+            </a:r>
+          </a:p>
+          <a:p>
+            <a:pPr lvl="1"/>
+            <a:endParaRPr lang="en-US" dirty="0"/>
+          </a:p>
+          <a:p>
+            <a:endParaRPr lang="en-US" dirty="0"/>
+          </a:p>
+        </p:txBody>
+      </p:sp>
+      <p:pic>
+        <p:nvPicPr>
+          <p:cNvPr id="4" name="Picture 3" descr="Photoshop_CC_icon.png"/>
+          <p:cNvPicPr>
+            <a:picLocks noChangeAspect="1"/>
+          </p:cNvPicPr>
+          <p:nvPr/>
+        </p:nvPicPr>
+        <p:blipFill>
+          <a:blip r:embed="rId2">
+            <a:extLst>
+              <a:ext uri="{28A0092B-C50C-407E-A947-70E740481C1C}">
+                <a14:useLocalDpi xmlns:a14="http://schemas.microsoft.com/office/drawing/2010/main" val="0"/>
+              </a:ext>
+            </a:extLst>
+          </a:blip>
+          <a:stretch>
+            <a:fillRect/>
+          </a:stretch>
+        </p:blipFill>
+        <p:spPr>
+          <a:xfrm>
+            <a:off x="3017201" y="4134696"/>
+            <a:ext cx="394187" cy="394187"/>
+          </a:xfrm>
+          <a:prstGeom prst="rect">
+            <a:avLst/>
+          </a:prstGeom>
+        </p:spPr>
+      </p:pic>
+    </p:spTree>
+    <p:extLst>
+      <p:ext uri="{BB962C8B-B14F-4D97-AF65-F5344CB8AC3E}">
+        <p14:creationId xmlns:p14="http://schemas.microsoft.com/office/powerpoint/2010/main" val="1202224775"/>
+      </p:ext>
+    </p:extLst>
+  </p:cSld>
+  <p:clrMapOvr>
+    <a:masterClrMapping/>
+  </p:clrMapOvr>
+</p:sld>
+</file>
+
+<file path=ppt/slides/slide11.xml><?xml version="1.0" encoding="utf-8"?>
 <p:sld xmlns:a="http://schemas.openxmlformats.org/drawingml/2006/main" xmlns:r="http://schemas.openxmlformats.org/officeDocument/2006/relationships" xmlns:p="http://schemas.openxmlformats.org/presentationml/2006/main">
   <p:cSld>
     <p:spTree>
@@ -8968,38 +8938,51 @@
             <a:spLocks noGrp="1"/>
           </p:cNvSpPr>
           <p:nvPr>
-            <p:ph type="title"/>
+            <p:ph type="ctrTitle"/>
           </p:nvPr>
         </p:nvSpPr>
         <p:spPr/>
         <p:txBody>
-          <a:bodyPr/>
-          <a:lstStyle/>
-          <a:p>
+          <a:bodyPr>
+            <a:normAutofit fontScale="90000"/>
+          </a:bodyPr>
+          <a:lstStyle/>
+          <a:p>
+            <a:r>
+              <a:rPr lang="en-US" dirty="0" err="1" smtClean="0"/>
+              <a:t>Git</a:t>
+            </a:r>
             <a:r>
               <a:rPr lang="en-US" dirty="0" smtClean="0"/>
-              <a:t>What is </a:t>
+              <a:t> &amp; </a:t>
             </a:r>
             <a:r>
               <a:rPr lang="en-US" dirty="0" err="1" smtClean="0"/>
-              <a:t>git</a:t>
+              <a:t>GitHub</a:t>
             </a:r>
             <a:r>
               <a:rPr lang="en-US" dirty="0" smtClean="0"/>
-              <a:t>?</a:t>
-            </a:r>
-            <a:endParaRPr lang="en-US" dirty="0"/>
-          </a:p>
-        </p:txBody>
-      </p:sp>
-      <p:sp>
-        <p:nvSpPr>
-          <p:cNvPr id="3" name="Content Placeholder 2"/>
-          <p:cNvSpPr>
-            <a:spLocks noGrp="1"/>
-          </p:cNvSpPr>
-          <p:nvPr>
-            <p:ph idx="1"/>
+              <a:t> For Design</a:t>
+            </a:r>
+            <a:br>
+              <a:rPr lang="en-US" dirty="0" smtClean="0"/>
+            </a:br>
+            <a:r>
+              <a:rPr lang="en-US" sz="900" dirty="0" smtClean="0"/>
+              <a:t>(and some other people)</a:t>
+            </a:r>
+            <a:endParaRPr lang="en-US" sz="900" dirty="0"/>
+          </a:p>
+        </p:txBody>
+      </p:sp>
+      <p:sp>
+        <p:nvSpPr>
+          <p:cNvPr id="3" name="Subtitle 2"/>
+          <p:cNvSpPr>
+            <a:spLocks noGrp="1"/>
+          </p:cNvSpPr>
+          <p:nvPr>
+            <p:ph type="subTitle" idx="1"/>
           </p:nvPr>
         </p:nvSpPr>
         <p:spPr/>
@@ -9010,152 +8993,292 @@
           <a:lstStyle/>
           <a:p>
             <a:r>
+              <a:rPr lang="en-US" dirty="0" smtClean="0"/>
+              <a:t>To unify and simplify how design assets are managed and hosted.</a:t>
+            </a:r>
+            <a:endParaRPr lang="en-US" dirty="0"/>
+          </a:p>
+        </p:txBody>
+      </p:sp>
+      <p:sp>
+        <p:nvSpPr>
+          <p:cNvPr id="4" name="Subtitle 2"/>
+          <p:cNvSpPr txBox="1">
+            <a:spLocks/>
+          </p:cNvSpPr>
+          <p:nvPr/>
+        </p:nvSpPr>
+        <p:spPr>
+          <a:xfrm>
+            <a:off x="-1" y="6290555"/>
+            <a:ext cx="5442857" cy="567445"/>
+          </a:xfrm>
+          <a:prstGeom prst="rect">
+            <a:avLst/>
+          </a:prstGeom>
+        </p:spPr>
+        <p:txBody>
+          <a:bodyPr vert="horz" lIns="91440" tIns="45720" rIns="91440" bIns="45720" rtlCol="0">
+            <a:normAutofit/>
+          </a:bodyPr>
+          <a:lstStyle>
+            <a:lvl1pPr marL="0" indent="0" algn="l" defTabSz="914400" rtl="0" eaLnBrk="1" latinLnBrk="0" hangingPunct="1">
+              <a:spcBef>
+                <a:spcPts val="300"/>
+              </a:spcBef>
+              <a:buClr>
+                <a:schemeClr val="accent1"/>
+              </a:buClr>
+              <a:buSzPct val="75000"/>
+              <a:buFont typeface="Wingdings" pitchFamily="2" charset="2"/>
+              <a:buNone/>
+              <a:defRPr sz="1400" kern="1200">
+                <a:solidFill>
+                  <a:schemeClr val="tx1">
+                    <a:tint val="75000"/>
+                  </a:schemeClr>
+                </a:solidFill>
+                <a:latin typeface="+mn-lt"/>
+                <a:ea typeface="+mn-ea"/>
+                <a:cs typeface="+mn-cs"/>
+              </a:defRPr>
+            </a:lvl1pPr>
+            <a:lvl2pPr marL="457200" indent="0" algn="ctr" defTabSz="914400" rtl="0" eaLnBrk="1" latinLnBrk="0" hangingPunct="1">
+              <a:spcBef>
+                <a:spcPts val="600"/>
+              </a:spcBef>
+              <a:buClr>
+                <a:schemeClr val="accent1">
+                  <a:lumMod val="60000"/>
+                  <a:lumOff val="40000"/>
+                </a:schemeClr>
+              </a:buClr>
+              <a:buSzPct val="75000"/>
+              <a:buFont typeface="Wingdings" pitchFamily="2" charset="2"/>
+              <a:buNone/>
+              <a:defRPr sz="1800" kern="1200">
+                <a:solidFill>
+                  <a:schemeClr val="tx1">
+                    <a:tint val="75000"/>
+                  </a:schemeClr>
+                </a:solidFill>
+                <a:latin typeface="+mn-lt"/>
+                <a:ea typeface="+mn-ea"/>
+                <a:cs typeface="+mn-cs"/>
+              </a:defRPr>
+            </a:lvl2pPr>
+            <a:lvl3pPr marL="914400" indent="0" algn="ctr" defTabSz="914400" rtl="0" eaLnBrk="1" latinLnBrk="0" hangingPunct="1">
+              <a:spcBef>
+                <a:spcPts val="600"/>
+              </a:spcBef>
+              <a:buClr>
+                <a:schemeClr val="accent1"/>
+              </a:buClr>
+              <a:buSzPct val="75000"/>
+              <a:buFont typeface="Wingdings" pitchFamily="2" charset="2"/>
+              <a:buNone/>
+              <a:defRPr sz="1800" kern="1200">
+                <a:solidFill>
+                  <a:schemeClr val="tx1">
+                    <a:tint val="75000"/>
+                  </a:schemeClr>
+                </a:solidFill>
+                <a:latin typeface="+mn-lt"/>
+                <a:ea typeface="+mn-ea"/>
+                <a:cs typeface="+mn-cs"/>
+              </a:defRPr>
+            </a:lvl3pPr>
+            <a:lvl4pPr marL="1371600" indent="0" algn="ctr" defTabSz="914400" rtl="0" eaLnBrk="1" latinLnBrk="0" hangingPunct="1">
+              <a:spcBef>
+                <a:spcPts val="600"/>
+              </a:spcBef>
+              <a:buClr>
+                <a:schemeClr val="accent1">
+                  <a:lumMod val="60000"/>
+                  <a:lumOff val="40000"/>
+                </a:schemeClr>
+              </a:buClr>
+              <a:buSzPct val="75000"/>
+              <a:buFont typeface="Wingdings" pitchFamily="2" charset="2"/>
+              <a:buNone/>
+              <a:defRPr sz="1800" kern="1200">
+                <a:solidFill>
+                  <a:schemeClr val="tx1">
+                    <a:tint val="75000"/>
+                  </a:schemeClr>
+                </a:solidFill>
+                <a:latin typeface="+mn-lt"/>
+                <a:ea typeface="+mn-ea"/>
+                <a:cs typeface="+mn-cs"/>
+              </a:defRPr>
+            </a:lvl4pPr>
+            <a:lvl5pPr marL="1828800" indent="0" algn="ctr" defTabSz="914400" rtl="0" eaLnBrk="1" latinLnBrk="0" hangingPunct="1">
+              <a:spcBef>
+                <a:spcPts val="600"/>
+              </a:spcBef>
+              <a:buClr>
+                <a:schemeClr val="accent1"/>
+              </a:buClr>
+              <a:buSzPct val="75000"/>
+              <a:buFont typeface="Wingdings" pitchFamily="2" charset="2"/>
+              <a:buNone/>
+              <a:defRPr sz="1800" kern="1200">
+                <a:solidFill>
+                  <a:schemeClr val="tx1">
+                    <a:tint val="75000"/>
+                  </a:schemeClr>
+                </a:solidFill>
+                <a:latin typeface="+mn-lt"/>
+                <a:ea typeface="+mn-ea"/>
+                <a:cs typeface="+mn-cs"/>
+              </a:defRPr>
+            </a:lvl5pPr>
+            <a:lvl6pPr marL="2286000" indent="0" algn="ctr" defTabSz="914400" rtl="0" eaLnBrk="1" latinLnBrk="0" hangingPunct="1">
+              <a:spcBef>
+                <a:spcPct val="20000"/>
+              </a:spcBef>
+              <a:buClr>
+                <a:schemeClr val="accent1">
+                  <a:lumMod val="60000"/>
+                  <a:lumOff val="40000"/>
+                </a:schemeClr>
+              </a:buClr>
+              <a:buSzPct val="75000"/>
+              <a:buFont typeface="Wingdings" pitchFamily="2" charset="2"/>
+              <a:buNone/>
+              <a:defRPr lang="en-US" sz="1800" kern="1200">
+                <a:solidFill>
+                  <a:schemeClr val="tx1">
+                    <a:tint val="75000"/>
+                  </a:schemeClr>
+                </a:solidFill>
+                <a:latin typeface="+mn-lt"/>
+                <a:ea typeface="+mn-ea"/>
+                <a:cs typeface="+mn-cs"/>
+              </a:defRPr>
+            </a:lvl6pPr>
+            <a:lvl7pPr marL="2743200" indent="0" algn="ctr" defTabSz="914400" rtl="0" eaLnBrk="1" latinLnBrk="0" hangingPunct="1">
+              <a:spcBef>
+                <a:spcPct val="20000"/>
+              </a:spcBef>
+              <a:buClr>
+                <a:schemeClr val="accent1"/>
+              </a:buClr>
+              <a:buSzPct val="75000"/>
+              <a:buFont typeface="Wingdings" pitchFamily="2" charset="2"/>
+              <a:buNone/>
+              <a:defRPr lang="en-US" sz="1800" kern="1200" baseline="0">
+                <a:solidFill>
+                  <a:schemeClr val="tx1">
+                    <a:tint val="75000"/>
+                  </a:schemeClr>
+                </a:solidFill>
+                <a:latin typeface="+mn-lt"/>
+                <a:ea typeface="+mn-ea"/>
+                <a:cs typeface="+mn-cs"/>
+              </a:defRPr>
+            </a:lvl7pPr>
+            <a:lvl8pPr marL="3200400" indent="0" algn="ctr" defTabSz="914400" rtl="0" eaLnBrk="1" latinLnBrk="0" hangingPunct="1">
+              <a:spcBef>
+                <a:spcPct val="20000"/>
+              </a:spcBef>
+              <a:buClr>
+                <a:schemeClr val="accent1">
+                  <a:lumMod val="60000"/>
+                  <a:lumOff val="40000"/>
+                </a:schemeClr>
+              </a:buClr>
+              <a:buSzPct val="75000"/>
+              <a:buFont typeface="Wingdings" pitchFamily="2" charset="2"/>
+              <a:buNone/>
+              <a:defRPr lang="en-US" sz="1800" kern="1200" baseline="0">
+                <a:solidFill>
+                  <a:schemeClr val="tx1">
+                    <a:tint val="75000"/>
+                  </a:schemeClr>
+                </a:solidFill>
+                <a:latin typeface="+mn-lt"/>
+                <a:ea typeface="+mn-ea"/>
+                <a:cs typeface="+mn-cs"/>
+              </a:defRPr>
+            </a:lvl8pPr>
+            <a:lvl9pPr marL="3657600" indent="0" algn="ctr" defTabSz="914400" rtl="0" eaLnBrk="1" latinLnBrk="0" hangingPunct="1">
+              <a:spcBef>
+                <a:spcPct val="20000"/>
+              </a:spcBef>
+              <a:buClr>
+                <a:schemeClr val="accent1"/>
+              </a:buClr>
+              <a:buSzPct val="75000"/>
+              <a:buFont typeface="Wingdings" pitchFamily="2" charset="2"/>
+              <a:buNone/>
+              <a:defRPr lang="en-US" sz="1800" kern="1200" baseline="0">
+                <a:solidFill>
+                  <a:schemeClr val="tx1">
+                    <a:tint val="75000"/>
+                  </a:schemeClr>
+                </a:solidFill>
+                <a:latin typeface="+mn-lt"/>
+                <a:ea typeface="+mn-ea"/>
+                <a:cs typeface="+mn-cs"/>
+              </a:defRPr>
+            </a:lvl9pPr>
+          </a:lstStyle>
+          <a:p>
+            <a:r>
+              <a:rPr lang="en-US" dirty="0" smtClean="0"/>
+              <a:t>I even used </a:t>
+            </a:r>
+            <a:r>
               <a:rPr lang="en-US" dirty="0" err="1" smtClean="0"/>
-              <a:t>Git</a:t>
+              <a:t>git</a:t>
             </a:r>
             <a:r>
               <a:rPr lang="en-US" dirty="0" smtClean="0"/>
-              <a:t> is a file versioning system.</a:t>
-            </a:r>
-          </a:p>
-          <a:p>
-            <a:pPr lvl="1"/>
+              <a:t> to create this </a:t>
+            </a:r>
             <a:r>
               <a:rPr lang="en-US" dirty="0" smtClean="0"/>
-              <a:t>You overwrite the </a:t>
-            </a:r>
-            <a:r>
-              <a:rPr lang="en-US" b="1" dirty="0" smtClean="0">
-                <a:solidFill>
-                  <a:srgbClr val="FF8000"/>
-                </a:solidFill>
-              </a:rPr>
-              <a:t>same </a:t>
-            </a:r>
-            <a:r>
-              <a:rPr lang="en-US" dirty="0" smtClean="0"/>
-              <a:t>file as a </a:t>
-            </a:r>
-            <a:r>
-              <a:rPr lang="en-US" b="1" dirty="0" smtClean="0">
-                <a:solidFill>
-                  <a:srgbClr val="FF8000"/>
-                </a:solidFill>
-              </a:rPr>
-              <a:t>new version</a:t>
-            </a:r>
-            <a:r>
-              <a:rPr lang="en-US" dirty="0" smtClean="0"/>
-              <a:t>, then push your changes to a central server, which houses everything</a:t>
-            </a:r>
-          </a:p>
-          <a:p>
-            <a:pPr lvl="1"/>
-            <a:r>
-              <a:rPr lang="en-US" dirty="0" smtClean="0"/>
-              <a:t>Versions are known as </a:t>
-            </a:r>
-            <a:r>
-              <a:rPr lang="en-US" b="1" dirty="0" smtClean="0">
-                <a:solidFill>
-                  <a:srgbClr val="FF8000"/>
-                </a:solidFill>
-              </a:rPr>
-              <a:t>commits</a:t>
-            </a:r>
-            <a:r>
-              <a:rPr lang="en-US" dirty="0" smtClean="0"/>
-              <a:t>,</a:t>
-            </a:r>
+              <a:t>presentation!</a:t>
+            </a:r>
+          </a:p>
+          <a:p>
             <a:r>
               <a:rPr lang="en-US" dirty="0"/>
-              <a:t> </a:t>
-            </a:r>
-            <a:r>
-              <a:rPr lang="en-US" dirty="0" smtClean="0"/>
-              <a:t>which create change history </a:t>
-            </a:r>
-            <a:endParaRPr lang="en-US" b="1" dirty="0" smtClean="0">
-              <a:solidFill>
-                <a:srgbClr val="FF8000"/>
-              </a:solidFill>
-            </a:endParaRPr>
-          </a:p>
-          <a:p>
-            <a:pPr lvl="1"/>
-            <a:r>
-              <a:rPr lang="en-US" dirty="0" smtClean="0"/>
-              <a:t>If two people are working on the same file, then can be automatically merged together and combine your work. Merging two peoples work creates a </a:t>
-            </a:r>
-            <a:r>
-              <a:rPr lang="en-US" b="1" dirty="0">
-                <a:solidFill>
-                  <a:srgbClr val="FF8000"/>
-                </a:solidFill>
-              </a:rPr>
-              <a:t>m</a:t>
-            </a:r>
-            <a:r>
-              <a:rPr lang="en-US" b="1" dirty="0" smtClean="0">
-                <a:solidFill>
-                  <a:srgbClr val="FF8000"/>
-                </a:solidFill>
-              </a:rPr>
-              <a:t>erge commit</a:t>
-            </a:r>
-            <a:r>
-              <a:rPr lang="en-US" dirty="0" smtClean="0"/>
-              <a:t>, or a </a:t>
-            </a:r>
-            <a:r>
-              <a:rPr lang="en-US" b="1" dirty="0" smtClean="0">
-                <a:solidFill>
-                  <a:srgbClr val="FF8000"/>
-                </a:solidFill>
-              </a:rPr>
-              <a:t>Pull Request</a:t>
-            </a:r>
-          </a:p>
-          <a:p>
-            <a:pPr lvl="1"/>
-            <a:r>
-              <a:rPr lang="en-US" b="1" dirty="0" smtClean="0">
-                <a:solidFill>
-                  <a:srgbClr val="FF8000"/>
-                </a:solidFill>
-              </a:rPr>
-              <a:t>Pull Requests</a:t>
-            </a:r>
-            <a:r>
-              <a:rPr lang="en-US" dirty="0" smtClean="0"/>
-              <a:t> create an authority chain, to denote approving assets</a:t>
-            </a:r>
-          </a:p>
-          <a:p>
-            <a:pPr lvl="1"/>
-            <a:r>
-              <a:rPr lang="en-US" b="1" dirty="0" smtClean="0">
-                <a:solidFill>
-                  <a:srgbClr val="FF8000"/>
-                </a:solidFill>
-              </a:rPr>
-              <a:t>I will show real world examples of this stuff.</a:t>
-            </a:r>
-          </a:p>
-          <a:p>
-            <a:pPr lvl="1"/>
-            <a:endParaRPr lang="en-US" b="1" dirty="0">
-              <a:solidFill>
-                <a:srgbClr val="FF8000"/>
-              </a:solidFill>
-            </a:endParaRPr>
+              <a:t>https://</a:t>
+            </a:r>
+            <a:r>
+              <a:rPr lang="en-US" dirty="0" err="1"/>
+              <a:t>github.com</a:t>
+            </a:r>
+            <a:r>
+              <a:rPr lang="en-US" dirty="0"/>
+              <a:t>/</a:t>
+            </a:r>
+            <a:r>
+              <a:rPr lang="en-US" dirty="0" err="1"/>
+              <a:t>RyanCopley</a:t>
+            </a:r>
+            <a:r>
+              <a:rPr lang="en-US" dirty="0"/>
+              <a:t>/</a:t>
+            </a:r>
+            <a:r>
+              <a:rPr lang="en-US" dirty="0" err="1"/>
+              <a:t>git</a:t>
+            </a:r>
+            <a:r>
+              <a:rPr lang="en-US" dirty="0"/>
+              <a:t>-for-designers</a:t>
+            </a:r>
+            <a:endParaRPr lang="en-US" dirty="0"/>
           </a:p>
         </p:txBody>
       </p:sp>
     </p:spTree>
     <p:extLst>
       <p:ext uri="{BB962C8B-B14F-4D97-AF65-F5344CB8AC3E}">
-        <p14:creationId xmlns:p14="http://schemas.microsoft.com/office/powerpoint/2010/main" val="3885541854"/>
+        <p14:creationId xmlns:p14="http://schemas.microsoft.com/office/powerpoint/2010/main" val="770392377"/>
       </p:ext>
     </p:extLst>
   </p:cSld>
@@ -9203,7 +9326,7 @@
             </a:r>
             <a:r>
               <a:rPr lang="en-US" dirty="0" err="1" smtClean="0"/>
-              <a:t>GitHub</a:t>
+              <a:t>git</a:t>
             </a:r>
             <a:r>
               <a:rPr lang="en-US" dirty="0" smtClean="0"/>
@@ -9225,47 +9348,68 @@
         </p:nvSpPr>
         <p:spPr/>
         <p:txBody>
-          <a:bodyPr/>
-          <a:lstStyle/>
-          <a:p>
+          <a:bodyPr>
+            <a:normAutofit/>
+          </a:bodyPr>
+          <a:lstStyle/>
+          <a:p>
+            <a:r>
+              <a:rPr lang="en-US" dirty="0" err="1" smtClean="0"/>
+              <a:t>Git</a:t>
+            </a:r>
             <a:r>
               <a:rPr lang="en-US" dirty="0" smtClean="0"/>
-              <a:t>A website that manages your </a:t>
-            </a:r>
-            <a:r>
-              <a:rPr lang="en-US" dirty="0" err="1" smtClean="0"/>
-              <a:t>git</a:t>
-            </a:r>
+              <a:t> is a file versioning system.</a:t>
+            </a:r>
+          </a:p>
+          <a:p>
+            <a:pPr lvl="1"/>
             <a:r>
               <a:rPr lang="en-US" dirty="0" smtClean="0"/>
-              <a:t> repositories. </a:t>
+              <a:t>You overwrite the </a:t>
+            </a:r>
+            <a:r>
+              <a:rPr lang="en-US" b="1" dirty="0" smtClean="0">
+                <a:solidFill>
+                  <a:srgbClr val="FF8000"/>
+                </a:solidFill>
+              </a:rPr>
+              <a:t>same </a:t>
+            </a:r>
+            <a:r>
+              <a:rPr lang="en-US" dirty="0" smtClean="0"/>
+              <a:t>file as a </a:t>
+            </a:r>
+            <a:r>
+              <a:rPr lang="en-US" b="1" dirty="0" smtClean="0">
+                <a:solidFill>
+                  <a:srgbClr val="FF8000"/>
+                </a:solidFill>
+              </a:rPr>
+              <a:t>new version</a:t>
+            </a:r>
+            <a:r>
+              <a:rPr lang="en-US" dirty="0" smtClean="0"/>
+              <a:t>, then push your changes to a central server, which houses everything</a:t>
             </a:r>
           </a:p>
           <a:p>
             <a:pPr lvl="1"/>
             <a:r>
               <a:rPr lang="en-US" dirty="0" smtClean="0"/>
-              <a:t>Has managed access controls</a:t>
-            </a:r>
-          </a:p>
-          <a:p>
+              <a:t>Versions are known as </a:t>
+            </a:r>
+            <a:r>
+              <a:rPr lang="en-US" b="1" dirty="0" smtClean="0">
+                <a:solidFill>
+                  <a:srgbClr val="FF8000"/>
+                </a:solidFill>
+              </a:rPr>
+              <a:t>commits</a:t>
+            </a:r>
             <a:r>
               <a:rPr lang="en-US" dirty="0" smtClean="0"/>
-              <a:t>You will not need to use much command line stuff, because excellent GUI tools exist.</a:t>
-            </a:r>
-          </a:p>
-          <a:p>
-            <a:r>
-              <a:rPr lang="en-US" dirty="0" err="1" smtClean="0"/>
-              <a:t>GitHub</a:t>
-            </a:r>
-            <a:r>
-              <a:rPr lang="en-US" dirty="0" smtClean="0"/>
-              <a:t> is what made </a:t>
-            </a:r>
-            <a:r>
-              <a:rPr lang="en-US" dirty="0" err="1" smtClean="0"/>
-              <a:t>git</a:t>
+              <a:t>,</a:t>
             </a:r>
             <a:r>
               <a:rPr lang="en-US" dirty="0"/>
@@ -9273,21 +9417,89 @@
             </a:r>
             <a:r>
               <a:rPr lang="en-US" dirty="0" smtClean="0"/>
-              <a:t>awesome for designers.</a:t>
-            </a:r>
-          </a:p>
-          <a:p>
-            <a:pPr marL="0" indent="0">
-              <a:buNone/>
-            </a:pPr>
-            <a:endParaRPr lang="en-US" dirty="0" smtClean="0"/>
+              <a:t>which create change history </a:t>
+            </a:r>
+            <a:endParaRPr lang="en-US" b="1" dirty="0" smtClean="0">
+              <a:solidFill>
+                <a:srgbClr val="FF8000"/>
+              </a:solidFill>
+            </a:endParaRPr>
+          </a:p>
+          <a:p>
+            <a:pPr lvl="1"/>
+            <a:r>
+              <a:rPr lang="en-US" dirty="0" smtClean="0"/>
+              <a:t>If two people are working on the same file, then can be automatically merged together and combine your work. Merging two peoples work creates a </a:t>
+            </a:r>
+            <a:r>
+              <a:rPr lang="en-US" b="1" dirty="0">
+                <a:solidFill>
+                  <a:srgbClr val="FF8000"/>
+                </a:solidFill>
+              </a:rPr>
+              <a:t>m</a:t>
+            </a:r>
+            <a:r>
+              <a:rPr lang="en-US" b="1" dirty="0" smtClean="0">
+                <a:solidFill>
+                  <a:srgbClr val="FF8000"/>
+                </a:solidFill>
+              </a:rPr>
+              <a:t>erge commit</a:t>
+            </a:r>
+            <a:r>
+              <a:rPr lang="en-US" dirty="0" smtClean="0"/>
+              <a:t>, or a </a:t>
+            </a:r>
+            <a:r>
+              <a:rPr lang="en-US" b="1" dirty="0" smtClean="0">
+                <a:solidFill>
+                  <a:srgbClr val="FF8000"/>
+                </a:solidFill>
+              </a:rPr>
+              <a:t>Pull Request</a:t>
+            </a:r>
+          </a:p>
+          <a:p>
+            <a:pPr lvl="1"/>
+            <a:r>
+              <a:rPr lang="en-US" b="1" dirty="0" smtClean="0">
+                <a:solidFill>
+                  <a:srgbClr val="FF8000"/>
+                </a:solidFill>
+              </a:rPr>
+              <a:t>Pull Requests</a:t>
+            </a:r>
+            <a:r>
+              <a:rPr lang="en-US" dirty="0" smtClean="0"/>
+              <a:t> create an authority chain, to denote approving assets</a:t>
+            </a:r>
+          </a:p>
+          <a:p>
+            <a:pPr lvl="1"/>
+            <a:r>
+              <a:rPr lang="en-US" b="1" dirty="0" smtClean="0">
+                <a:solidFill>
+                  <a:srgbClr val="FF8000"/>
+                </a:solidFill>
+              </a:rPr>
+              <a:t>I will show real world examples of this stuff.</a:t>
+            </a:r>
+          </a:p>
+          <a:p>
+            <a:pPr lvl="1"/>
+            <a:endParaRPr lang="en-US" b="1" dirty="0">
+              <a:solidFill>
+                <a:srgbClr val="FF8000"/>
+              </a:solidFill>
+            </a:endParaRPr>
           </a:p>
         </p:txBody>
       </p:sp>
     </p:spTree>
     <p:extLst>
       <p:ext uri="{BB962C8B-B14F-4D97-AF65-F5344CB8AC3E}">
-        <p14:creationId xmlns:p14="http://schemas.microsoft.com/office/powerpoint/2010/main" val="1103122778"/>
+        <p14:creationId xmlns:p14="http://schemas.microsoft.com/office/powerpoint/2010/main" val="3885541854"/>
       </p:ext>
     </p:extLst>
   </p:cSld>
@@ -9331,7 +9543,15 @@
           <a:p>
             <a:r>
               <a:rPr lang="en-US" dirty="0" smtClean="0"/>
-              <a:t>How does this help designers?</a:t>
+              <a:t>What is </a:t>
+            </a:r>
+            <a:r>
+              <a:rPr lang="en-US" dirty="0" err="1" smtClean="0"/>
+              <a:t>GitHub</a:t>
+            </a:r>
+            <a:r>
+              <a:rPr lang="en-US" dirty="0" smtClean="0"/>
+              <a:t>?</a:t>
             </a:r>
             <a:endParaRPr lang="en-US" dirty="0"/>
           </a:p>
@@ -9347,58 +9567,14 @@
             <p:ph idx="1"/>
           </p:nvPr>
         </p:nvSpPr>
-        <p:spPr>
-          <a:xfrm>
-            <a:off x="498474" y="1981200"/>
-            <a:ext cx="7556313" cy="4788877"/>
-          </a:xfrm>
-        </p:spPr>
-        <p:txBody>
-          <a:bodyPr>
-            <a:normAutofit/>
-          </a:bodyPr>
+        <p:spPr/>
+        <p:txBody>
+          <a:bodyPr/>
           <a:lstStyle/>
           <a:p>
             <a:r>
               <a:rPr lang="en-US" dirty="0" smtClean="0"/>
-              <a:t>Hosting for your design assets, yay </a:t>
-            </a:r>
-            <a:r>
-              <a:rPr lang="en-US" dirty="0" smtClean="0">
-                <a:sym typeface="Wingdings"/>
-              </a:rPr>
-              <a:t></a:t>
-            </a:r>
-            <a:endParaRPr lang="en-US" dirty="0" smtClean="0"/>
-          </a:p>
-          <a:p>
-            <a:r>
-              <a:rPr lang="en-US" dirty="0" smtClean="0"/>
-              <a:t>Unlimited undo's, even from other designers undo history</a:t>
-            </a:r>
-          </a:p>
-          <a:p>
-            <a:pPr lvl="1"/>
-            <a:r>
-              <a:rPr lang="en-US" dirty="0" smtClean="0"/>
-              <a:t>(Sort of, but trust me, it’s awesome</a:t>
-            </a:r>
-            <a:r>
-              <a:rPr lang="en-US" dirty="0" smtClean="0"/>
-              <a:t>)</a:t>
-            </a:r>
-          </a:p>
-          <a:p>
-            <a:r>
-              <a:rPr lang="en-US" dirty="0" smtClean="0"/>
-              <a:t>Branching</a:t>
-            </a:r>
-            <a:endParaRPr lang="en-US" dirty="0" smtClean="0"/>
-          </a:p>
-          <a:p>
-            <a:r>
-              <a:rPr lang="en-US" dirty="0" smtClean="0"/>
-              <a:t>It is very easy to link a JIRA ticket in </a:t>
+              <a:t>A website that manages your </a:t>
             </a:r>
             <a:r>
               <a:rPr lang="en-US" dirty="0" err="1" smtClean="0"/>
@@ -9406,34 +9582,48 @@
             </a:r>
             <a:r>
               <a:rPr lang="en-US" dirty="0" smtClean="0"/>
-              <a:t>, associating your work </a:t>
+              <a:t> repositories. </a:t>
+            </a:r>
+          </a:p>
+          <a:p>
+            <a:pPr lvl="1"/>
+            <a:r>
+              <a:rPr lang="en-US" dirty="0" smtClean="0"/>
+              <a:t>Has managed access controls</a:t>
+            </a:r>
+          </a:p>
+          <a:p>
+            <a:r>
+              <a:rPr lang="en-US" dirty="0" smtClean="0"/>
+              <a:t>You will not need to use much command line stuff, because excellent GUI tools exist.</a:t>
+            </a:r>
+          </a:p>
+          <a:p>
+            <a:r>
+              <a:rPr lang="en-US" dirty="0" err="1" smtClean="0"/>
+              <a:t>GitHub</a:t>
+            </a:r>
+            <a:r>
+              <a:rPr lang="en-US" dirty="0" smtClean="0"/>
+              <a:t> is what made </a:t>
+            </a:r>
+            <a:r>
+              <a:rPr lang="en-US" dirty="0" err="1" smtClean="0"/>
+              <a:t>git</a:t>
             </a:r>
             <a:r>
               <a:rPr lang="en-US" dirty="0"/>
-              <a:t>with </a:t>
+              <a:t> </a:t>
             </a:r>
             <a:r>
               <a:rPr lang="en-US" dirty="0" smtClean="0"/>
-              <a:t>JIRA</a:t>
-            </a:r>
-          </a:p>
-          <a:p>
-            <a:r>
-              <a:rPr lang="en-US" dirty="0" smtClean="0"/>
-              <a:t>Allows any designer to work on any project, since PSDs will be centrally stored.</a:t>
-            </a:r>
-          </a:p>
-          <a:p>
-            <a:r>
-              <a:rPr lang="en-US" dirty="0" smtClean="0"/>
-              <a:t>It’s </a:t>
-            </a:r>
-            <a:r>
-              <a:rPr lang="en-US" dirty="0"/>
-              <a:t>free for us (Thank Gannett Digital)</a:t>
-            </a:r>
-          </a:p>
-          <a:p>
+              <a:t>awesome for designers.</a:t>
+            </a:r>
+          </a:p>
+          <a:p>
+            <a:pPr marL="0" indent="0">
+              <a:buNone/>
+            </a:pPr>
             <a:endParaRPr lang="en-US" dirty="0" smtClean="0"/>
           </a:p>
         </p:txBody>
@@ -9441,7 +9631,7 @@
     </p:spTree>
     <p:extLst>
       <p:ext uri="{BB962C8B-B14F-4D97-AF65-F5344CB8AC3E}">
-        <p14:creationId xmlns:p14="http://schemas.microsoft.com/office/powerpoint/2010/main" val="3173516093"/>
+        <p14:creationId xmlns:p14="http://schemas.microsoft.com/office/powerpoint/2010/main" val="1103122778"/>
       </p:ext>
     </p:extLst>
   </p:cSld>
@@ -9480,127 +9670,114 @@
         </p:nvSpPr>
         <p:spPr/>
         <p:txBody>
+          <a:bodyPr/>
+          <a:lstStyle/>
+          <a:p>
+            <a:r>
+              <a:rPr lang="en-US" dirty="0" smtClean="0"/>
+              <a:t>How does this help designers?</a:t>
+            </a:r>
+            <a:endParaRPr lang="en-US" dirty="0"/>
+          </a:p>
+        </p:txBody>
+      </p:sp>
+      <p:sp>
+        <p:nvSpPr>
+          <p:cNvPr id="3" name="Content Placeholder 2"/>
+          <p:cNvSpPr>
+            <a:spLocks noGrp="1"/>
+          </p:cNvSpPr>
+          <p:nvPr>
+            <p:ph idx="1"/>
+          </p:nvPr>
+        </p:nvSpPr>
+        <p:spPr>
+          <a:xfrm>
+            <a:off x="498474" y="1981200"/>
+            <a:ext cx="7556313" cy="4788877"/>
+          </a:xfrm>
+        </p:spPr>
+        <p:txBody>
           <a:bodyPr>
-            <a:normAutofit fontScale="90000"/>
+            <a:normAutofit/>
           </a:bodyPr>
           <a:lstStyle/>
           <a:p>
             <a:r>
               <a:rPr lang="en-US" dirty="0" smtClean="0"/>
-              <a:t>What advantages does this have over JIRA, ZIPs, </a:t>
-            </a:r>
-            <a:r>
-              <a:rPr lang="en-US" dirty="0" err="1" smtClean="0"/>
-              <a:t>dropbox</a:t>
-            </a:r>
-            <a:endParaRPr lang="en-US" dirty="0"/>
-          </a:p>
-        </p:txBody>
-      </p:sp>
-      <p:sp>
-        <p:nvSpPr>
-          <p:cNvPr id="3" name="Content Placeholder 2"/>
-          <p:cNvSpPr>
-            <a:spLocks noGrp="1"/>
-          </p:cNvSpPr>
-          <p:nvPr>
-            <p:ph idx="1"/>
-          </p:nvPr>
-        </p:nvSpPr>
-        <p:spPr/>
-        <p:txBody>
-          <a:bodyPr>
-            <a:normAutofit fontScale="92500" lnSpcReduction="20000"/>
-          </a:bodyPr>
-          <a:lstStyle/>
-          <a:p>
-            <a:r>
-              <a:rPr lang="en-US" dirty="0" smtClean="0"/>
-              <a:t>All design assets are centrally located</a:t>
-            </a:r>
-          </a:p>
-          <a:p>
-            <a:r>
-              <a:rPr lang="en-US" dirty="0" smtClean="0"/>
-              <a:t>A very clear understanding of what assets are approved</a:t>
-            </a:r>
-          </a:p>
-          <a:p>
-            <a:r>
-              <a:rPr lang="en-US" dirty="0" smtClean="0"/>
-              <a:t>No more file size upload restrictions (JIRA)</a:t>
-            </a:r>
-          </a:p>
-          <a:p>
-            <a:r>
-              <a:rPr lang="en-US" dirty="0" smtClean="0"/>
-              <a:t>Zipping stuff takes time, and causes confusion</a:t>
-            </a:r>
-          </a:p>
-          <a:p>
-            <a:pPr lvl="1"/>
-            <a:r>
-              <a:rPr lang="en-US" dirty="0" smtClean="0"/>
-              <a:t>This zip only has a subsection, that zip has the whole thing, this zip is named final_2.zip,  </a:t>
-            </a:r>
-            <a:r>
-              <a:rPr lang="en-US" dirty="0" err="1" smtClean="0"/>
-              <a:t>etc</a:t>
-            </a:r>
-            <a:endParaRPr lang="en-US" dirty="0" smtClean="0"/>
-          </a:p>
-          <a:p>
-            <a:pPr lvl="1"/>
-            <a:r>
-              <a:rPr lang="en-US" dirty="0" smtClean="0"/>
-              <a:t>You can’t see “inside” a zip unless you download and extract it</a:t>
-            </a:r>
-            <a:endParaRPr lang="en-US" dirty="0" smtClean="0"/>
-          </a:p>
-          <a:p>
-            <a:r>
-              <a:rPr lang="en-US" dirty="0" smtClean="0"/>
-              <a:t>There are file ownership issues with </a:t>
-            </a:r>
-            <a:r>
-              <a:rPr lang="en-US" dirty="0" err="1" smtClean="0"/>
-              <a:t>DropBox</a:t>
-            </a:r>
-            <a:endParaRPr lang="en-US" dirty="0" smtClean="0"/>
-          </a:p>
-          <a:p>
-            <a:pPr lvl="1"/>
-            <a:r>
-              <a:rPr lang="en-US" dirty="0" smtClean="0"/>
-              <a:t>We can’t see inside your </a:t>
-            </a:r>
-            <a:r>
-              <a:rPr lang="en-US" dirty="0" err="1" smtClean="0"/>
-              <a:t>dropbox</a:t>
-            </a:r>
-            <a:r>
-              <a:rPr lang="en-US" dirty="0" smtClean="0"/>
-              <a:t> easily </a:t>
+              <a:t>Hosting for your design assets, yay </a:t>
             </a:r>
             <a:r>
               <a:rPr lang="en-US" dirty="0" smtClean="0">
                 <a:sym typeface="Wingdings"/>
               </a:rPr>
-              <a:t> </a:t>
+              <a:t></a:t>
             </a:r>
             <a:endParaRPr lang="en-US" dirty="0" smtClean="0"/>
           </a:p>
           <a:p>
             <a:r>
               <a:rPr lang="en-US" dirty="0" smtClean="0"/>
-              <a:t>All of Gannett Digital uses it for code and configurations, so design is the next step! </a:t>
-            </a:r>
-            <a:r>
-              <a:rPr lang="en-US" dirty="0" smtClean="0">
-                <a:sym typeface="Wingdings"/>
-              </a:rPr>
-              <a:t> </a:t>
-            </a:r>
+              <a:t>Unlimited undo's, even from other designers undo history</a:t>
+            </a:r>
+          </a:p>
+          <a:p>
+            <a:pPr lvl="1"/>
+            <a:r>
+              <a:rPr lang="en-US" dirty="0" smtClean="0"/>
+              <a:t>(Sort of, but trust me, it’s awesome</a:t>
+            </a:r>
+            <a:r>
+              <a:rPr lang="en-US" dirty="0" smtClean="0"/>
+              <a:t>)</a:t>
+            </a:r>
+          </a:p>
+          <a:p>
+            <a:r>
+              <a:rPr lang="en-US" dirty="0" smtClean="0"/>
+              <a:t>Branching</a:t>
+            </a:r>
+            <a:endParaRPr lang="en-US" dirty="0" smtClean="0"/>
+          </a:p>
+          <a:p>
+            <a:r>
+              <a:rPr lang="en-US" dirty="0" smtClean="0"/>
+              <a:t>It is very easy to link a JIRA ticket in </a:t>
+            </a:r>
+            <a:r>
+              <a:rPr lang="en-US" dirty="0" err="1" smtClean="0"/>
+              <a:t>git</a:t>
+            </a:r>
+            <a:r>
+              <a:rPr lang="en-US" dirty="0" smtClean="0"/>
+              <a:t>, associating your work </a:t>
+            </a:r>
+            <a:r>
+              <a:rPr lang="en-US" dirty="0"/>
+              <a:t>with </a:t>
+            </a:r>
+            <a:r>
+              <a:rPr lang="en-US" dirty="0" smtClean="0"/>
+              <a:t>JIRA</a:t>
+            </a:r>
+          </a:p>
+          <a:p>
+            <a:r>
+              <a:rPr lang="en-US" dirty="0" smtClean="0"/>
+              <a:t>Allows any designer to work on any project, since PSDs will be centrally stored.</a:t>
+            </a:r>
+          </a:p>
+          <a:p>
+            <a:r>
+              <a:rPr lang="en-US" dirty="0" smtClean="0"/>
+              <a:t>It’s </a:t>
+            </a:r>
+            <a:r>
+              <a:rPr lang="en-US" dirty="0"/>
+              <a:t>free for us (Thank Gannett Digital)</a:t>
+            </a:r>
+          </a:p>
+          <a:p>
             <a:endParaRPr lang="en-US" dirty="0" smtClean="0"/>
           </a:p>
         </p:txBody>
@@ -9608,7 +9785,7 @@
     </p:spTree>
     <p:extLst>
       <p:ext uri="{BB962C8B-B14F-4D97-AF65-F5344CB8AC3E}">
-        <p14:creationId xmlns:p14="http://schemas.microsoft.com/office/powerpoint/2010/main" val="1011556746"/>
+        <p14:creationId xmlns:p14="http://schemas.microsoft.com/office/powerpoint/2010/main" val="3173516093"/>
       </p:ext>
     </p:extLst>
   </p:cSld>
@@ -9647,12 +9824,18 @@
         </p:nvSpPr>
         <p:spPr/>
         <p:txBody>
-          <a:bodyPr/>
+          <a:bodyPr>
+            <a:normAutofit fontScale="90000"/>
+          </a:bodyPr>
           <a:lstStyle/>
           <a:p>
             <a:r>
               <a:rPr lang="en-US" dirty="0" smtClean="0"/>
-              <a:t>History</a:t>
+              <a:t>What advantages does this have over JIRA, ZIPs, </a:t>
+            </a:r>
+            <a:r>
+              <a:rPr lang="en-US" dirty="0" err="1" smtClean="0"/>
+              <a:t>dropbox</a:t>
             </a:r>
             <a:endParaRPr lang="en-US" dirty="0"/>
           </a:p>
@@ -9668,33 +9851,41 @@
             <p:ph idx="1"/>
           </p:nvPr>
         </p:nvSpPr>
-        <p:spPr>
-          <a:xfrm>
-            <a:off x="498474" y="1600200"/>
-            <a:ext cx="7556313" cy="4525963"/>
-          </a:xfrm>
-        </p:spPr>
-        <p:txBody>
-          <a:bodyPr/>
+        <p:spPr/>
+        <p:txBody>
+          <a:bodyPr>
+            <a:normAutofit fontScale="92500" lnSpcReduction="20000"/>
+          </a:bodyPr>
           <a:lstStyle/>
           <a:p>
             <a:r>
               <a:rPr lang="en-US" dirty="0" smtClean="0"/>
-              <a:t>“undo” history, but built into </a:t>
-            </a:r>
-            <a:r>
-              <a:rPr lang="en-US" dirty="0" err="1" smtClean="0"/>
-              <a:t>git</a:t>
-            </a:r>
+              <a:t>All design assets are centrally located</a:t>
+            </a:r>
+          </a:p>
+          <a:p>
             <a:r>
               <a:rPr lang="en-US" dirty="0" smtClean="0"/>
-              <a:t>!</a:t>
+              <a:t>A very clear understanding of what assets are approved</a:t>
             </a:r>
           </a:p>
           <a:p>
             <a:r>
               <a:rPr lang="en-US" dirty="0" smtClean="0"/>
-              <a:t>Can span between days, between Photoshop crashing, </a:t>
+              <a:t>No more file size upload restrictions (JIRA)</a:t>
+            </a:r>
+          </a:p>
+          <a:p>
+            <a:r>
+              <a:rPr lang="en-US" dirty="0" smtClean="0"/>
+              <a:t>Zipping stuff takes time, and causes confusion</a:t>
+            </a:r>
+          </a:p>
+          <a:p>
+            <a:pPr lvl="1"/>
+            <a:r>
+              <a:rPr lang="en-US" dirty="0" smtClean="0"/>
+              <a:t>This zip only has a subsection, that zip has the whole thing, this zip is named final_2.zip,  </a:t>
             </a:r>
             <a:r>
               <a:rPr lang="en-US" dirty="0" err="1" smtClean="0"/>
@@ -9703,30 +9894,65 @@
             <a:endParaRPr lang="en-US" dirty="0" smtClean="0"/>
           </a:p>
           <a:p>
+            <a:pPr lvl="1"/>
             <a:r>
               <a:rPr lang="en-US" dirty="0" smtClean="0"/>
-              <a:t>Is as simple as pushing a button (and maybe a description)</a:t>
-            </a:r>
+              <a:t>You can’t see “inside” a zip unless you download and extract it</a:t>
+            </a:r>
+            <a:endParaRPr lang="en-US" dirty="0" smtClean="0"/>
           </a:p>
           <a:p>
             <a:r>
               <a:rPr lang="en-US" dirty="0" smtClean="0"/>
-              <a:t>When you push the button, the work you’ve done is “written” into the history of the repository, and you can go back to this point at any time</a:t>
-            </a:r>
-          </a:p>
-          <a:p>
+              <a:t>There are file ownership issues with </a:t>
+            </a:r>
+            <a:r>
+              <a:rPr lang="en-US" dirty="0" err="1" smtClean="0"/>
+              <a:t>DropBox</a:t>
+            </a:r>
+            <a:endParaRPr lang="en-US" dirty="0" smtClean="0"/>
+          </a:p>
+          <a:p>
+            <a:pPr lvl="1"/>
             <a:r>
               <a:rPr lang="en-US" dirty="0" smtClean="0"/>
-              <a:t>History is attached to your name, so we can see who did what work.</a:t>
-            </a:r>
-            <a:endParaRPr lang="en-US" dirty="0"/>
+              <a:t>We can’t see inside your </a:t>
+            </a:r>
+            <a:r>
+              <a:rPr lang="en-US" dirty="0" err="1" smtClean="0"/>
+              <a:t>dropbox</a:t>
+            </a:r>
+            <a:r>
+              <a:rPr lang="en-US" dirty="0" smtClean="0"/>
+              <a:t> easily </a:t>
+            </a:r>
+            <a:r>
+              <a:rPr lang="en-US" dirty="0" smtClean="0">
+                <a:sym typeface="Wingdings"/>
+              </a:rPr>
+              <a:t> </a:t>
+            </a:r>
+            <a:endParaRPr lang="en-US" dirty="0" smtClean="0"/>
+          </a:p>
+          <a:p>
+            <a:r>
+              <a:rPr lang="en-US" dirty="0" smtClean="0"/>
+              <a:t>All of Gannett Digital uses it for code and configurations, so design is the next step! </a:t>
+            </a:r>
+            <a:r>
+              <a:rPr lang="en-US" dirty="0" smtClean="0">
+                <a:sym typeface="Wingdings"/>
+              </a:rPr>
+              <a:t> </a:t>
+            </a:r>
+            <a:endParaRPr lang="en-US" dirty="0" smtClean="0"/>
           </a:p>
         </p:txBody>
       </p:sp>
     </p:spTree>
     <p:extLst>
       <p:ext uri="{BB962C8B-B14F-4D97-AF65-F5344CB8AC3E}">
-        <p14:creationId xmlns:p14="http://schemas.microsoft.com/office/powerpoint/2010/main" val="1090168707"/>
+        <p14:creationId xmlns:p14="http://schemas.microsoft.com/office/powerpoint/2010/main" val="1011556746"/>
       </p:ext>
     </p:extLst>
   </p:cSld>
@@ -9770,46 +9996,81 @@
           <a:p>
             <a:r>
               <a:rPr lang="en-US" dirty="0" smtClean="0"/>
-              <a:t>Real world example</a:t>
+              <a:t>History</a:t>
             </a:r>
             <a:endParaRPr lang="en-US" dirty="0"/>
           </a:p>
         </p:txBody>
       </p:sp>
-      <p:pic>
-        <p:nvPicPr>
-          <p:cNvPr id="4" name="Picture 3" descr="Screen Shot 2015-01-26 at 4.55.20 PM.png"/>
-          <p:cNvPicPr>
-            <a:picLocks noChangeAspect="1"/>
-          </p:cNvPicPr>
-          <p:nvPr/>
-        </p:nvPicPr>
-        <p:blipFill>
-          <a:blip r:embed="rId2">
-            <a:extLst>
-              <a:ext uri="{28A0092B-C50C-407E-A947-70E740481C1C}">
-                <a14:useLocalDpi xmlns:a14="http://schemas.microsoft.com/office/drawing/2010/main" val="0"/>
-              </a:ext>
-            </a:extLst>
-          </a:blip>
-          <a:stretch>
-            <a:fillRect/>
-          </a:stretch>
-        </p:blipFill>
-        <p:spPr>
-          <a:xfrm>
-            <a:off x="254000" y="1052286"/>
-            <a:ext cx="6042804" cy="6858000"/>
-          </a:xfrm>
-          <a:prstGeom prst="rect">
-            <a:avLst/>
-          </a:prstGeom>
-        </p:spPr>
-      </p:pic>
+      <p:sp>
+        <p:nvSpPr>
+          <p:cNvPr id="3" name="Content Placeholder 2"/>
+          <p:cNvSpPr>
+            <a:spLocks noGrp="1"/>
+          </p:cNvSpPr>
+          <p:nvPr>
+            <p:ph idx="1"/>
+          </p:nvPr>
+        </p:nvSpPr>
+        <p:spPr>
+          <a:xfrm>
+            <a:off x="498474" y="1600200"/>
+            <a:ext cx="7556313" cy="4525963"/>
+          </a:xfrm>
+        </p:spPr>
+        <p:txBody>
+          <a:bodyPr/>
+          <a:lstStyle/>
+          <a:p>
+            <a:r>
+              <a:rPr lang="en-US" dirty="0" smtClean="0"/>
+              <a:t>“undo” history, but built into </a:t>
+            </a:r>
+            <a:r>
+              <a:rPr lang="en-US" dirty="0" err="1" smtClean="0"/>
+              <a:t>git</a:t>
+            </a:r>
+            <a:r>
+              <a:rPr lang="en-US" dirty="0" smtClean="0"/>
+              <a:t>!</a:t>
+            </a:r>
+          </a:p>
+          <a:p>
+            <a:r>
+              <a:rPr lang="en-US" dirty="0" smtClean="0"/>
+              <a:t>Can span between days, between Photoshop crashing, </a:t>
+            </a:r>
+            <a:r>
+              <a:rPr lang="en-US" dirty="0" err="1" smtClean="0"/>
+              <a:t>etc</a:t>
+            </a:r>
+            <a:endParaRPr lang="en-US" dirty="0" smtClean="0"/>
+          </a:p>
+          <a:p>
+            <a:r>
+              <a:rPr lang="en-US" dirty="0" smtClean="0"/>
+              <a:t>Is as simple as pushing a button (and maybe a description)</a:t>
+            </a:r>
+          </a:p>
+          <a:p>
+            <a:r>
+              <a:rPr lang="en-US" dirty="0" smtClean="0"/>
+              <a:t>When you push the button, the work you’ve done is “written” into the history of the repository, and you can go back to this point at any time</a:t>
+            </a:r>
+          </a:p>
+          <a:p>
+            <a:r>
+              <a:rPr lang="en-US" dirty="0" smtClean="0"/>
+              <a:t>History is attached to your name, so we can see who did what work.</a:t>
+            </a:r>
+            <a:endParaRPr lang="en-US" dirty="0"/>
+          </a:p>
+        </p:txBody>
+      </p:sp>
     </p:spTree>
     <p:extLst>
       <p:ext uri="{BB962C8B-B14F-4D97-AF65-F5344CB8AC3E}">
-        <p14:creationId xmlns:p14="http://schemas.microsoft.com/office/powerpoint/2010/main" val="4207486474"/>
+        <p14:creationId xmlns:p14="http://schemas.microsoft.com/office/powerpoint/2010/main" val="1090168707"/>
       </p:ext>
     </p:extLst>
   </p:cSld>
@@ -9853,69 +10114,15 @@
           <a:p>
             <a:r>
               <a:rPr lang="en-US" dirty="0" smtClean="0"/>
-              <a:t>Branching</a:t>
+              <a:t>Real world example</a:t>
             </a:r>
             <a:endParaRPr lang="en-US" dirty="0"/>
-          </a:p>
-        </p:txBody>
-      </p:sp>
-      <p:sp>
-        <p:nvSpPr>
-          <p:cNvPr id="3" name="Content Placeholder 2"/>
-          <p:cNvSpPr>
-            <a:spLocks noGrp="1"/>
-          </p:cNvSpPr>
-          <p:nvPr>
-            <p:ph idx="1"/>
-          </p:nvPr>
-        </p:nvSpPr>
-        <p:spPr>
-          <a:xfrm>
-            <a:off x="498474" y="1599174"/>
-            <a:ext cx="6071043" cy="3736040"/>
-          </a:xfrm>
-        </p:spPr>
-        <p:txBody>
-          <a:bodyPr/>
-          <a:lstStyle/>
-          <a:p>
-            <a:r>
-              <a:rPr lang="en-US" dirty="0" smtClean="0"/>
-              <a:t>Branching</a:t>
-            </a:r>
-          </a:p>
-          <a:p>
-            <a:pPr lvl="1"/>
-            <a:r>
-              <a:rPr lang="en-US" dirty="0" smtClean="0"/>
-              <a:t>Side by side versions, which stem from a common parent</a:t>
-            </a:r>
-          </a:p>
-          <a:p>
-            <a:pPr lvl="1"/>
-            <a:r>
-              <a:rPr lang="en-US" dirty="0" smtClean="0"/>
-              <a:t>Allows you to make MULTIPLE versions of the same file to present</a:t>
-            </a:r>
-          </a:p>
-          <a:p>
-            <a:pPr lvl="1"/>
-            <a:r>
-              <a:rPr lang="en-US" dirty="0" smtClean="0"/>
-              <a:t>Useful when you don’t have concrete ideas and need some room for creative freedom</a:t>
-            </a:r>
-          </a:p>
-          <a:p>
-            <a:endParaRPr lang="en-US" dirty="0" smtClean="0"/>
-          </a:p>
-          <a:p>
-            <a:endParaRPr lang="en-US" dirty="0" smtClean="0"/>
           </a:p>
         </p:txBody>
       </p:sp>
       <p:pic>
         <p:nvPicPr>
-          <p:cNvPr id="4" name="Picture 3" descr="Screen Shot 2015-01-26 at 3.23.33 PM.png"/>
+          <p:cNvPr id="4" name="Picture 3" descr="Screen Shot 2015-01-26 at 4.55.20 PM.png"/>
           <p:cNvPicPr>
             <a:picLocks noChangeAspect="1"/>
           </p:cNvPicPr>
@@ -9935,8 +10142,8 @@
         </p:blipFill>
         <p:spPr>
           <a:xfrm>
-            <a:off x="6569517" y="2842312"/>
-            <a:ext cx="2508820" cy="3780509"/>
+            <a:off x="254000" y="1052286"/>
+            <a:ext cx="6042804" cy="6858000"/>
           </a:xfrm>
           <a:prstGeom prst="rect">
             <a:avLst/>
@@ -9946,7 +10153,7 @@
     </p:spTree>
     <p:extLst>
       <p:ext uri="{BB962C8B-B14F-4D97-AF65-F5344CB8AC3E}">
-        <p14:creationId xmlns:p14="http://schemas.microsoft.com/office/powerpoint/2010/main" val="1885091767"/>
+        <p14:creationId xmlns:p14="http://schemas.microsoft.com/office/powerpoint/2010/main" val="4207486474"/>
       </p:ext>
     </p:extLst>
   </p:cSld>
@@ -9990,7 +10197,7 @@
           <a:p>
             <a:r>
               <a:rPr lang="en-US" dirty="0" smtClean="0"/>
-              <a:t>Real world example of branching</a:t>
+              <a:t>Branching</a:t>
             </a:r>
             <a:endParaRPr lang="en-US" dirty="0"/>
           </a:p>
@@ -10006,177 +10213,53 @@
             <p:ph idx="1"/>
           </p:nvPr>
         </p:nvSpPr>
-        <p:spPr/>
-        <p:txBody>
-          <a:bodyPr>
-            <a:normAutofit/>
-          </a:bodyPr>
-          <a:lstStyle/>
+        <p:spPr>
+          <a:xfrm>
+            <a:off x="498474" y="1599174"/>
+            <a:ext cx="6071043" cy="3736040"/>
+          </a:xfrm>
+        </p:spPr>
+        <p:txBody>
+          <a:bodyPr/>
+          <a:lstStyle/>
+          <a:p>
+            <a:r>
+              <a:rPr lang="en-US" dirty="0" smtClean="0"/>
+              <a:t>Branching</a:t>
+            </a:r>
+          </a:p>
           <a:p>
             <a:pPr lvl="1"/>
             <a:r>
               <a:rPr lang="en-US" dirty="0" smtClean="0"/>
-              <a:t>Context: We have a splash screen which is currently </a:t>
-            </a:r>
-            <a:r>
-              <a:rPr lang="en-US" dirty="0" smtClean="0">
-                <a:solidFill>
-                  <a:srgbClr val="FF0000"/>
-                </a:solidFill>
-              </a:rPr>
-              <a:t>RED</a:t>
-            </a:r>
+              <a:t>Side by side versions, which stem from a common parent</a:t>
+            </a:r>
+          </a:p>
+          <a:p>
+            <a:pPr lvl="1"/>
             <a:r>
               <a:rPr lang="en-US" dirty="0" smtClean="0"/>
-              <a:t>, and has been approved and is in the master repo.</a:t>
+              <a:t>Allows you to make MULTIPLE versions of the same file to present</a:t>
             </a:r>
           </a:p>
           <a:p>
             <a:pPr lvl="1"/>
             <a:r>
               <a:rPr lang="en-US" dirty="0" smtClean="0"/>
-              <a:t>PM</a:t>
-            </a:r>
-            <a:r>
-              <a:rPr lang="en-US" dirty="0"/>
-              <a:t>: “I know you made a red splash screen, but I want to see orange and brown to see if they’re better. Can you do both and let me see?”</a:t>
-            </a:r>
-          </a:p>
-          <a:p>
-            <a:pPr lvl="1"/>
-            <a:r>
-              <a:rPr lang="en-US" dirty="0"/>
-              <a:t>Two branches, an </a:t>
-            </a:r>
-            <a:r>
-              <a:rPr lang="en-US" dirty="0">
-                <a:solidFill>
-                  <a:srgbClr val="FF6600"/>
-                </a:solidFill>
-              </a:rPr>
-              <a:t>ORANGE</a:t>
-            </a:r>
-            <a:r>
-              <a:rPr lang="en-US" dirty="0"/>
-              <a:t> branch, and a </a:t>
-            </a:r>
-            <a:r>
-              <a:rPr lang="en-US" dirty="0">
-                <a:solidFill>
-                  <a:srgbClr val="996633"/>
-                </a:solidFill>
-              </a:rPr>
-              <a:t>BROWN</a:t>
-            </a:r>
-            <a:r>
-              <a:rPr lang="en-US" dirty="0"/>
-              <a:t> branch, which are parents of </a:t>
-            </a:r>
-            <a:r>
-              <a:rPr lang="en-US" dirty="0" smtClean="0">
-                <a:solidFill>
-                  <a:srgbClr val="FF0000"/>
-                </a:solidFill>
-              </a:rPr>
-              <a:t>RED</a:t>
-            </a:r>
-            <a:r>
-              <a:rPr lang="en-US" dirty="0" smtClean="0"/>
-              <a:t>, which has already been approved (master)</a:t>
-            </a:r>
-          </a:p>
-          <a:p>
-            <a:pPr lvl="1"/>
-            <a:r>
-              <a:rPr lang="en-US" dirty="0" smtClean="0"/>
-              <a:t>You do the work…         Show the PM…</a:t>
-            </a:r>
-          </a:p>
-          <a:p>
-            <a:pPr lvl="1"/>
-            <a:r>
-              <a:rPr lang="en-US" dirty="0" smtClean="0"/>
-              <a:t>PM: “I think I like </a:t>
-            </a:r>
-            <a:r>
-              <a:rPr lang="en-US" dirty="0" smtClean="0">
-                <a:solidFill>
-                  <a:srgbClr val="996633"/>
-                </a:solidFill>
-              </a:rPr>
-              <a:t>BROWN</a:t>
-            </a:r>
-            <a:r>
-              <a:rPr lang="en-US" dirty="0" smtClean="0"/>
-              <a:t>, lets use that one”</a:t>
-            </a:r>
-          </a:p>
-          <a:p>
-            <a:pPr lvl="1"/>
-            <a:r>
-              <a:rPr lang="en-US" dirty="0" smtClean="0">
-                <a:solidFill>
-                  <a:srgbClr val="996633"/>
-                </a:solidFill>
-              </a:rPr>
-              <a:t>BROWN</a:t>
-            </a:r>
-            <a:r>
-              <a:rPr lang="en-US" dirty="0" smtClean="0"/>
-              <a:t> would then be merged (By management) into the (</a:t>
-            </a:r>
-            <a:r>
-              <a:rPr lang="en-US" dirty="0" smtClean="0">
-                <a:solidFill>
-                  <a:srgbClr val="FF0000"/>
-                </a:solidFill>
-              </a:rPr>
-              <a:t>RED</a:t>
-            </a:r>
-            <a:r>
-              <a:rPr lang="en-US" dirty="0" smtClean="0"/>
-              <a:t>) master repo, signaling approval. </a:t>
-            </a:r>
-          </a:p>
-          <a:p>
-            <a:pPr lvl="1"/>
-            <a:r>
-              <a:rPr lang="en-US" dirty="0" smtClean="0">
-                <a:solidFill>
-                  <a:srgbClr val="996633"/>
-                </a:solidFill>
-              </a:rPr>
-              <a:t>BROWN</a:t>
-            </a:r>
-            <a:r>
-              <a:rPr lang="en-US" dirty="0" smtClean="0"/>
-              <a:t> and </a:t>
-            </a:r>
-            <a:r>
-              <a:rPr lang="en-US" dirty="0" smtClean="0">
-                <a:solidFill>
-                  <a:srgbClr val="FF6600"/>
-                </a:solidFill>
-              </a:rPr>
-              <a:t>ORANGE</a:t>
-            </a:r>
-            <a:r>
-              <a:rPr lang="en-US" dirty="0" smtClean="0"/>
-              <a:t> branches could be deleted once the work is approved. (Optional)</a:t>
-            </a:r>
-          </a:p>
-          <a:p>
-            <a:pPr lvl="1"/>
-            <a:endParaRPr lang="en-US" dirty="0"/>
-          </a:p>
-          <a:p>
-            <a:endParaRPr lang="en-US" dirty="0"/>
+              <a:t>Useful when you don’t have concrete ideas and need some room for creative freedom</a:t>
+            </a:r>
+          </a:p>
+          <a:p>
+            <a:endParaRPr lang="en-US" dirty="0" smtClean="0"/>
+          </a:p>
+          <a:p>
+            <a:endParaRPr lang="en-US" dirty="0" smtClean="0"/>
           </a:p>
         </p:txBody>
       </p:sp>
       <p:pic>
         <p:nvPicPr>
-          <p:cNvPr id="4" name="Picture 3" descr="Photoshop_CC_icon.png"/>
+          <p:cNvPr id="4" name="Picture 3" descr="Screen Shot 2015-01-26 at 3.23.33 PM.png"/>
           <p:cNvPicPr>
             <a:picLocks noChangeAspect="1"/>
           </p:cNvPicPr>
@@ -10196,8 +10279,8 @@
         </p:blipFill>
         <p:spPr>
           <a:xfrm>
-            <a:off x="3017201" y="4134696"/>
-            <a:ext cx="394187" cy="394187"/>
+            <a:off x="6569517" y="2842312"/>
+            <a:ext cx="2508820" cy="3780509"/>
           </a:xfrm>
           <a:prstGeom prst="rect">
             <a:avLst/>
@@ -10207,7 +10290,7 @@
     </p:spTree>
     <p:extLst>
       <p:ext uri="{BB962C8B-B14F-4D97-AF65-F5344CB8AC3E}">
-        <p14:creationId xmlns:p14="http://schemas.microsoft.com/office/powerpoint/2010/main" val="1202224775"/>
+        <p14:creationId xmlns:p14="http://schemas.microsoft.com/office/powerpoint/2010/main" val="1885091767"/>
       </p:ext>
     </p:extLst>
   </p:cSld>

</xml_diff>

<commit_message>
Hid the secret message
</commit_message>
<xml_diff>
--- a/Presentation.pptx
+++ b/Presentation.pptx
@@ -5,17 +5,16 @@
     <p:sldMasterId id="2147483990" r:id="rId1"/>
   </p:sldMasterIdLst>
   <p:sldIdLst>
-    <p:sldId id="266" r:id="rId2"/>
-    <p:sldId id="256" r:id="rId3"/>
-    <p:sldId id="257" r:id="rId4"/>
-    <p:sldId id="258" r:id="rId5"/>
-    <p:sldId id="259" r:id="rId6"/>
-    <p:sldId id="261" r:id="rId7"/>
-    <p:sldId id="264" r:id="rId8"/>
-    <p:sldId id="265" r:id="rId9"/>
-    <p:sldId id="262" r:id="rId10"/>
-    <p:sldId id="263" r:id="rId11"/>
-    <p:sldId id="260" r:id="rId12"/>
+    <p:sldId id="256" r:id="rId2"/>
+    <p:sldId id="257" r:id="rId3"/>
+    <p:sldId id="258" r:id="rId4"/>
+    <p:sldId id="259" r:id="rId5"/>
+    <p:sldId id="261" r:id="rId6"/>
+    <p:sldId id="264" r:id="rId7"/>
+    <p:sldId id="265" r:id="rId8"/>
+    <p:sldId id="262" r:id="rId9"/>
+    <p:sldId id="263" r:id="rId10"/>
+    <p:sldId id="260" r:id="rId11"/>
   </p:sldIdLst>
   <p:sldSz cx="9144000" cy="6858000" type="screen4x3"/>
   <p:notesSz cx="6858000" cy="9144000"/>
@@ -8432,17 +8431,63 @@
             <a:spLocks noGrp="1"/>
           </p:cNvSpPr>
           <p:nvPr>
-            <p:ph type="title"/>
+            <p:ph type="ctrTitle"/>
           </p:nvPr>
         </p:nvSpPr>
         <p:spPr/>
         <p:txBody>
-          <a:bodyPr/>
-          <a:lstStyle/>
-          <a:p>
+          <a:bodyPr>
+            <a:normAutofit fontScale="90000"/>
+          </a:bodyPr>
+          <a:lstStyle/>
+          <a:p>
+            <a:r>
+              <a:rPr lang="en-US" dirty="0" err="1" smtClean="0"/>
+              <a:t>Git</a:t>
+            </a:r>
             <a:r>
               <a:rPr lang="en-US" dirty="0" smtClean="0"/>
-              <a:t>SECRET MESSAGE</a:t>
+              <a:t> &amp; </a:t>
+            </a:r>
+            <a:r>
+              <a:rPr lang="en-US" dirty="0" err="1" smtClean="0"/>
+              <a:t>GitHub</a:t>
+            </a:r>
+            <a:r>
+              <a:rPr lang="en-US" dirty="0" smtClean="0"/>
+              <a:t> For Design</a:t>
+            </a:r>
+            <a:br>
+              <a:rPr lang="en-US" dirty="0" smtClean="0"/>
+            </a:br>
+            <a:r>
+              <a:rPr lang="en-US" sz="900" dirty="0" smtClean="0"/>
+              <a:t>(and some other people)</a:t>
+            </a:r>
+            <a:endParaRPr lang="en-US" sz="900" dirty="0"/>
+          </a:p>
+        </p:txBody>
+      </p:sp>
+      <p:sp>
+        <p:nvSpPr>
+          <p:cNvPr id="3" name="Subtitle 2"/>
+          <p:cNvSpPr>
+            <a:spLocks noGrp="1"/>
+          </p:cNvSpPr>
+          <p:nvPr>
+            <p:ph type="subTitle" idx="1"/>
+          </p:nvPr>
+        </p:nvSpPr>
+        <p:spPr/>
+        <p:txBody>
+          <a:bodyPr>
+            <a:normAutofit/>
+          </a:bodyPr>
+          <a:lstStyle/>
+          <a:p>
+            <a:r>
+              <a:rPr lang="en-US" dirty="0" smtClean="0"/>
+              <a:t>To unify and simplify how design assets are managed and hosted.</a:t>
             </a:r>
             <a:endParaRPr lang="en-US" dirty="0"/>
           </a:p>
@@ -8450,28 +8495,274 @@
       </p:sp>
       <p:sp>
         <p:nvSpPr>
-          <p:cNvPr id="3" name="Content Placeholder 2"/>
-          <p:cNvSpPr>
-            <a:spLocks noGrp="1"/>
-          </p:cNvSpPr>
-          <p:nvPr>
-            <p:ph idx="1"/>
-          </p:nvPr>
-        </p:nvSpPr>
-        <p:spPr/>
-        <p:txBody>
-          <a:bodyPr/>
-          <a:lstStyle/>
+          <p:cNvPr id="4" name="Subtitle 2"/>
+          <p:cNvSpPr txBox="1">
+            <a:spLocks/>
+          </p:cNvSpPr>
+          <p:nvPr/>
+        </p:nvSpPr>
+        <p:spPr>
+          <a:xfrm>
+            <a:off x="-1" y="6290555"/>
+            <a:ext cx="5442857" cy="567445"/>
+          </a:xfrm>
+          <a:prstGeom prst="rect">
+            <a:avLst/>
+          </a:prstGeom>
+        </p:spPr>
+        <p:txBody>
+          <a:bodyPr vert="horz" lIns="91440" tIns="45720" rIns="91440" bIns="45720" rtlCol="0">
+            <a:normAutofit/>
+          </a:bodyPr>
+          <a:lstStyle>
+            <a:lvl1pPr marL="0" indent="0" algn="l" defTabSz="914400" rtl="0" eaLnBrk="1" latinLnBrk="0" hangingPunct="1">
+              <a:spcBef>
+                <a:spcPts val="300"/>
+              </a:spcBef>
+              <a:buClr>
+                <a:schemeClr val="accent1"/>
+              </a:buClr>
+              <a:buSzPct val="75000"/>
+              <a:buFont typeface="Wingdings" pitchFamily="2" charset="2"/>
+              <a:buNone/>
+              <a:defRPr sz="1400" kern="1200">
+                <a:solidFill>
+                  <a:schemeClr val="tx1">
+                    <a:tint val="75000"/>
+                  </a:schemeClr>
+                </a:solidFill>
+                <a:latin typeface="+mn-lt"/>
+                <a:ea typeface="+mn-ea"/>
+                <a:cs typeface="+mn-cs"/>
+              </a:defRPr>
+            </a:lvl1pPr>
+            <a:lvl2pPr marL="457200" indent="0" algn="ctr" defTabSz="914400" rtl="0" eaLnBrk="1" latinLnBrk="0" hangingPunct="1">
+              <a:spcBef>
+                <a:spcPts val="600"/>
+              </a:spcBef>
+              <a:buClr>
+                <a:schemeClr val="accent1">
+                  <a:lumMod val="60000"/>
+                  <a:lumOff val="40000"/>
+                </a:schemeClr>
+              </a:buClr>
+              <a:buSzPct val="75000"/>
+              <a:buFont typeface="Wingdings" pitchFamily="2" charset="2"/>
+              <a:buNone/>
+              <a:defRPr sz="1800" kern="1200">
+                <a:solidFill>
+                  <a:schemeClr val="tx1">
+                    <a:tint val="75000"/>
+                  </a:schemeClr>
+                </a:solidFill>
+                <a:latin typeface="+mn-lt"/>
+                <a:ea typeface="+mn-ea"/>
+                <a:cs typeface="+mn-cs"/>
+              </a:defRPr>
+            </a:lvl2pPr>
+            <a:lvl3pPr marL="914400" indent="0" algn="ctr" defTabSz="914400" rtl="0" eaLnBrk="1" latinLnBrk="0" hangingPunct="1">
+              <a:spcBef>
+                <a:spcPts val="600"/>
+              </a:spcBef>
+              <a:buClr>
+                <a:schemeClr val="accent1"/>
+              </a:buClr>
+              <a:buSzPct val="75000"/>
+              <a:buFont typeface="Wingdings" pitchFamily="2" charset="2"/>
+              <a:buNone/>
+              <a:defRPr sz="1800" kern="1200">
+                <a:solidFill>
+                  <a:schemeClr val="tx1">
+                    <a:tint val="75000"/>
+                  </a:schemeClr>
+                </a:solidFill>
+                <a:latin typeface="+mn-lt"/>
+                <a:ea typeface="+mn-ea"/>
+                <a:cs typeface="+mn-cs"/>
+              </a:defRPr>
+            </a:lvl3pPr>
+            <a:lvl4pPr marL="1371600" indent="0" algn="ctr" defTabSz="914400" rtl="0" eaLnBrk="1" latinLnBrk="0" hangingPunct="1">
+              <a:spcBef>
+                <a:spcPts val="600"/>
+              </a:spcBef>
+              <a:buClr>
+                <a:schemeClr val="accent1">
+                  <a:lumMod val="60000"/>
+                  <a:lumOff val="40000"/>
+                </a:schemeClr>
+              </a:buClr>
+              <a:buSzPct val="75000"/>
+              <a:buFont typeface="Wingdings" pitchFamily="2" charset="2"/>
+              <a:buNone/>
+              <a:defRPr sz="1800" kern="1200">
+                <a:solidFill>
+                  <a:schemeClr val="tx1">
+                    <a:tint val="75000"/>
+                  </a:schemeClr>
+                </a:solidFill>
+                <a:latin typeface="+mn-lt"/>
+                <a:ea typeface="+mn-ea"/>
+                <a:cs typeface="+mn-cs"/>
+              </a:defRPr>
+            </a:lvl4pPr>
+            <a:lvl5pPr marL="1828800" indent="0" algn="ctr" defTabSz="914400" rtl="0" eaLnBrk="1" latinLnBrk="0" hangingPunct="1">
+              <a:spcBef>
+                <a:spcPts val="600"/>
+              </a:spcBef>
+              <a:buClr>
+                <a:schemeClr val="accent1"/>
+              </a:buClr>
+              <a:buSzPct val="75000"/>
+              <a:buFont typeface="Wingdings" pitchFamily="2" charset="2"/>
+              <a:buNone/>
+              <a:defRPr sz="1800" kern="1200">
+                <a:solidFill>
+                  <a:schemeClr val="tx1">
+                    <a:tint val="75000"/>
+                  </a:schemeClr>
+                </a:solidFill>
+                <a:latin typeface="+mn-lt"/>
+                <a:ea typeface="+mn-ea"/>
+                <a:cs typeface="+mn-cs"/>
+              </a:defRPr>
+            </a:lvl5pPr>
+            <a:lvl6pPr marL="2286000" indent="0" algn="ctr" defTabSz="914400" rtl="0" eaLnBrk="1" latinLnBrk="0" hangingPunct="1">
+              <a:spcBef>
+                <a:spcPct val="20000"/>
+              </a:spcBef>
+              <a:buClr>
+                <a:schemeClr val="accent1">
+                  <a:lumMod val="60000"/>
+                  <a:lumOff val="40000"/>
+                </a:schemeClr>
+              </a:buClr>
+              <a:buSzPct val="75000"/>
+              <a:buFont typeface="Wingdings" pitchFamily="2" charset="2"/>
+              <a:buNone/>
+              <a:defRPr lang="en-US" sz="1800" kern="1200">
+                <a:solidFill>
+                  <a:schemeClr val="tx1">
+                    <a:tint val="75000"/>
+                  </a:schemeClr>
+                </a:solidFill>
+                <a:latin typeface="+mn-lt"/>
+                <a:ea typeface="+mn-ea"/>
+                <a:cs typeface="+mn-cs"/>
+              </a:defRPr>
+            </a:lvl6pPr>
+            <a:lvl7pPr marL="2743200" indent="0" algn="ctr" defTabSz="914400" rtl="0" eaLnBrk="1" latinLnBrk="0" hangingPunct="1">
+              <a:spcBef>
+                <a:spcPct val="20000"/>
+              </a:spcBef>
+              <a:buClr>
+                <a:schemeClr val="accent1"/>
+              </a:buClr>
+              <a:buSzPct val="75000"/>
+              <a:buFont typeface="Wingdings" pitchFamily="2" charset="2"/>
+              <a:buNone/>
+              <a:defRPr lang="en-US" sz="1800" kern="1200" baseline="0">
+                <a:solidFill>
+                  <a:schemeClr val="tx1">
+                    <a:tint val="75000"/>
+                  </a:schemeClr>
+                </a:solidFill>
+                <a:latin typeface="+mn-lt"/>
+                <a:ea typeface="+mn-ea"/>
+                <a:cs typeface="+mn-cs"/>
+              </a:defRPr>
+            </a:lvl7pPr>
+            <a:lvl8pPr marL="3200400" indent="0" algn="ctr" defTabSz="914400" rtl="0" eaLnBrk="1" latinLnBrk="0" hangingPunct="1">
+              <a:spcBef>
+                <a:spcPct val="20000"/>
+              </a:spcBef>
+              <a:buClr>
+                <a:schemeClr val="accent1">
+                  <a:lumMod val="60000"/>
+                  <a:lumOff val="40000"/>
+                </a:schemeClr>
+              </a:buClr>
+              <a:buSzPct val="75000"/>
+              <a:buFont typeface="Wingdings" pitchFamily="2" charset="2"/>
+              <a:buNone/>
+              <a:defRPr lang="en-US" sz="1800" kern="1200" baseline="0">
+                <a:solidFill>
+                  <a:schemeClr val="tx1">
+                    <a:tint val="75000"/>
+                  </a:schemeClr>
+                </a:solidFill>
+                <a:latin typeface="+mn-lt"/>
+                <a:ea typeface="+mn-ea"/>
+                <a:cs typeface="+mn-cs"/>
+              </a:defRPr>
+            </a:lvl8pPr>
+            <a:lvl9pPr marL="3657600" indent="0" algn="ctr" defTabSz="914400" rtl="0" eaLnBrk="1" latinLnBrk="0" hangingPunct="1">
+              <a:spcBef>
+                <a:spcPct val="20000"/>
+              </a:spcBef>
+              <a:buClr>
+                <a:schemeClr val="accent1"/>
+              </a:buClr>
+              <a:buSzPct val="75000"/>
+              <a:buFont typeface="Wingdings" pitchFamily="2" charset="2"/>
+              <a:buNone/>
+              <a:defRPr lang="en-US" sz="1800" kern="1200" baseline="0">
+                <a:solidFill>
+                  <a:schemeClr val="tx1">
+                    <a:tint val="75000"/>
+                  </a:schemeClr>
+                </a:solidFill>
+                <a:latin typeface="+mn-lt"/>
+                <a:ea typeface="+mn-ea"/>
+                <a:cs typeface="+mn-cs"/>
+              </a:defRPr>
+            </a:lvl9pPr>
+          </a:lstStyle>
           <a:p>
             <a:r>
               <a:rPr lang="en-US" dirty="0" smtClean="0"/>
-              <a:t>Be the first to show this to Ryan to win a prize </a:t>
-            </a:r>
-            <a:r>
-              <a:rPr lang="en-US" dirty="0" smtClean="0">
-                <a:sym typeface="Wingdings"/>
-              </a:rPr>
-              <a:t> </a:t>
+              <a:t>I even used </a:t>
+            </a:r>
+            <a:r>
+              <a:rPr lang="en-US" dirty="0" err="1" smtClean="0"/>
+              <a:t>git</a:t>
+            </a:r>
+            <a:r>
+              <a:rPr lang="en-US" dirty="0" smtClean="0"/>
+              <a:t> to create this </a:t>
+            </a:r>
+            <a:r>
+              <a:rPr lang="en-US" dirty="0" smtClean="0"/>
+              <a:t>presentation!</a:t>
+            </a:r>
+          </a:p>
+          <a:p>
+            <a:r>
+              <a:rPr lang="en-US" dirty="0"/>
+              <a:t>https://</a:t>
+            </a:r>
+            <a:r>
+              <a:rPr lang="en-US" dirty="0" err="1"/>
+              <a:t>github.com</a:t>
+            </a:r>
+            <a:r>
+              <a:rPr lang="en-US" dirty="0"/>
+              <a:t>/</a:t>
+            </a:r>
+            <a:r>
+              <a:rPr lang="en-US" dirty="0" err="1"/>
+              <a:t>RyanCopley</a:t>
+            </a:r>
+            <a:r>
+              <a:rPr lang="en-US" dirty="0"/>
+              <a:t>/</a:t>
+            </a:r>
+            <a:r>
+              <a:rPr lang="en-US" dirty="0" err="1"/>
+              <a:t>git</a:t>
+            </a:r>
+            <a:r>
+              <a:rPr lang="en-US" dirty="0"/>
+              <a:t>-for-designers</a:t>
             </a:r>
             <a:endParaRPr lang="en-US" dirty="0"/>
           </a:p>
@@ -8480,7 +8771,7 @@
     </p:spTree>
     <p:extLst>
       <p:ext uri="{BB962C8B-B14F-4D97-AF65-F5344CB8AC3E}">
-        <p14:creationId xmlns:p14="http://schemas.microsoft.com/office/powerpoint/2010/main" val="3675867592"/>
+        <p14:creationId xmlns:p14="http://schemas.microsoft.com/office/powerpoint/2010/main" val="770392377"/>
       </p:ext>
     </p:extLst>
   </p:cSld>
@@ -8491,267 +8782,6 @@
 </file>
 
 <file path=ppt/slides/slide10.xml><?xml version="1.0" encoding="utf-8"?>
-<p:sld xmlns:a="http://schemas.openxmlformats.org/drawingml/2006/main" xmlns:r="http://schemas.openxmlformats.org/officeDocument/2006/relationships" xmlns:p="http://schemas.openxmlformats.org/presentationml/2006/main">
-  <p:cSld>
-    <p:spTree>
-      <p:nvGrpSpPr>
-        <p:cNvPr id="1" name=""/>
-        <p:cNvGrpSpPr/>
-        <p:nvPr/>
-      </p:nvGrpSpPr>
-      <p:grpSpPr>
-        <a:xfrm>
-          <a:off x="0" y="0"/>
-          <a:ext cx="0" cy="0"/>
-          <a:chOff x="0" y="0"/>
-          <a:chExt cx="0" cy="0"/>
-        </a:xfrm>
-      </p:grpSpPr>
-      <p:sp>
-        <p:nvSpPr>
-          <p:cNvPr id="2" name="Title 1"/>
-          <p:cNvSpPr>
-            <a:spLocks noGrp="1"/>
-          </p:cNvSpPr>
-          <p:nvPr>
-            <p:ph type="title"/>
-          </p:nvPr>
-        </p:nvSpPr>
-        <p:spPr/>
-        <p:txBody>
-          <a:bodyPr/>
-          <a:lstStyle/>
-          <a:p>
-            <a:r>
-              <a:rPr lang="en-US" dirty="0" smtClean="0"/>
-              <a:t>Real world example of branching</a:t>
-            </a:r>
-            <a:endParaRPr lang="en-US" dirty="0"/>
-          </a:p>
-        </p:txBody>
-      </p:sp>
-      <p:sp>
-        <p:nvSpPr>
-          <p:cNvPr id="3" name="Content Placeholder 2"/>
-          <p:cNvSpPr>
-            <a:spLocks noGrp="1"/>
-          </p:cNvSpPr>
-          <p:nvPr>
-            <p:ph idx="1"/>
-          </p:nvPr>
-        </p:nvSpPr>
-        <p:spPr/>
-        <p:txBody>
-          <a:bodyPr>
-            <a:normAutofit/>
-          </a:bodyPr>
-          <a:lstStyle/>
-          <a:p>
-            <a:pPr lvl="1"/>
-            <a:r>
-              <a:rPr lang="en-US" dirty="0" smtClean="0"/>
-              <a:t>Context: We have a splash screen which is currently </a:t>
-            </a:r>
-            <a:r>
-              <a:rPr lang="en-US" dirty="0" smtClean="0">
-                <a:solidFill>
-                  <a:srgbClr val="FF0000"/>
-                </a:solidFill>
-              </a:rPr>
-              <a:t>RED</a:t>
-            </a:r>
-            <a:r>
-              <a:rPr lang="en-US" dirty="0" smtClean="0"/>
-              <a:t>, and has been approved and is in the master repo.</a:t>
-            </a:r>
-          </a:p>
-          <a:p>
-            <a:pPr lvl="1"/>
-            <a:r>
-              <a:rPr lang="en-US" dirty="0" smtClean="0"/>
-              <a:t>PM</a:t>
-            </a:r>
-            <a:r>
-              <a:rPr lang="en-US" dirty="0"/>
-              <a:t>: “I know you made a red splash screen, but I want to see orange and brown to see if they’re better. Can you do both and let me see?”</a:t>
-            </a:r>
-          </a:p>
-          <a:p>
-            <a:pPr lvl="1"/>
-            <a:r>
-              <a:rPr lang="en-US" dirty="0"/>
-              <a:t>Two branches, an </a:t>
-            </a:r>
-            <a:r>
-              <a:rPr lang="en-US" dirty="0">
-                <a:solidFill>
-                  <a:srgbClr val="FF6600"/>
-                </a:solidFill>
-              </a:rPr>
-              <a:t>ORANGE</a:t>
-            </a:r>
-            <a:r>
-              <a:rPr lang="en-US" dirty="0"/>
-              <a:t> branch, and a </a:t>
-            </a:r>
-            <a:r>
-              <a:rPr lang="en-US" dirty="0">
-                <a:solidFill>
-                  <a:srgbClr val="996633"/>
-                </a:solidFill>
-              </a:rPr>
-              <a:t>BROWN</a:t>
-            </a:r>
-            <a:r>
-              <a:rPr lang="en-US" dirty="0"/>
-              <a:t> branch, which are parents of </a:t>
-            </a:r>
-            <a:r>
-              <a:rPr lang="en-US" dirty="0" smtClean="0">
-                <a:solidFill>
-                  <a:srgbClr val="FF0000"/>
-                </a:solidFill>
-              </a:rPr>
-              <a:t>RED</a:t>
-            </a:r>
-            <a:r>
-              <a:rPr lang="en-US" dirty="0" smtClean="0"/>
-              <a:t>, which has already been approved (master)</a:t>
-            </a:r>
-          </a:p>
-          <a:p>
-            <a:pPr lvl="1"/>
-            <a:r>
-              <a:rPr lang="en-US" dirty="0" smtClean="0"/>
-              <a:t>You do the work…         Show the PM…</a:t>
-            </a:r>
-          </a:p>
-          <a:p>
-            <a:pPr lvl="1"/>
-            <a:r>
-              <a:rPr lang="en-US" dirty="0" smtClean="0"/>
-              <a:t>PM: “I think I like </a:t>
-            </a:r>
-            <a:r>
-              <a:rPr lang="en-US" dirty="0" smtClean="0">
-                <a:solidFill>
-                  <a:srgbClr val="996633"/>
-                </a:solidFill>
-              </a:rPr>
-              <a:t>BROWN</a:t>
-            </a:r>
-            <a:r>
-              <a:rPr lang="en-US" dirty="0" smtClean="0"/>
-              <a:t>, lets use that one”</a:t>
-            </a:r>
-          </a:p>
-          <a:p>
-            <a:pPr lvl="1"/>
-            <a:r>
-              <a:rPr lang="en-US" dirty="0" smtClean="0">
-                <a:solidFill>
-                  <a:srgbClr val="996633"/>
-                </a:solidFill>
-              </a:rPr>
-              <a:t>BROWN</a:t>
-            </a:r>
-            <a:r>
-              <a:rPr lang="en-US" dirty="0" smtClean="0"/>
-              <a:t> would then be merged (By management) into the (</a:t>
-            </a:r>
-            <a:r>
-              <a:rPr lang="en-US" dirty="0" smtClean="0">
-                <a:solidFill>
-                  <a:srgbClr val="FF0000"/>
-                </a:solidFill>
-              </a:rPr>
-              <a:t>RED</a:t>
-            </a:r>
-            <a:r>
-              <a:rPr lang="en-US" dirty="0" smtClean="0"/>
-              <a:t>) master repo, signaling approval. </a:t>
-            </a:r>
-          </a:p>
-          <a:p>
-            <a:pPr lvl="1"/>
-            <a:r>
-              <a:rPr lang="en-US" dirty="0" smtClean="0">
-                <a:solidFill>
-                  <a:srgbClr val="996633"/>
-                </a:solidFill>
-              </a:rPr>
-              <a:t>BROWN</a:t>
-            </a:r>
-            <a:r>
-              <a:rPr lang="en-US" dirty="0" smtClean="0"/>
-              <a:t> and </a:t>
-            </a:r>
-            <a:r>
-              <a:rPr lang="en-US" dirty="0" smtClean="0">
-                <a:solidFill>
-                  <a:srgbClr val="FF6600"/>
-                </a:solidFill>
-              </a:rPr>
-              <a:t>ORANGE</a:t>
-            </a:r>
-            <a:r>
-              <a:rPr lang="en-US" dirty="0" smtClean="0"/>
-              <a:t> branches could be deleted once the work is approved. (Optional)</a:t>
-            </a:r>
-          </a:p>
-          <a:p>
-            <a:pPr lvl="1"/>
-            <a:endParaRPr lang="en-US" dirty="0"/>
-          </a:p>
-          <a:p>
-            <a:endParaRPr lang="en-US" dirty="0"/>
-          </a:p>
-        </p:txBody>
-      </p:sp>
-      <p:pic>
-        <p:nvPicPr>
-          <p:cNvPr id="4" name="Picture 3" descr="Photoshop_CC_icon.png"/>
-          <p:cNvPicPr>
-            <a:picLocks noChangeAspect="1"/>
-          </p:cNvPicPr>
-          <p:nvPr/>
-        </p:nvPicPr>
-        <p:blipFill>
-          <a:blip r:embed="rId2">
-            <a:extLst>
-              <a:ext uri="{28A0092B-C50C-407E-A947-70E740481C1C}">
-                <a14:useLocalDpi xmlns:a14="http://schemas.microsoft.com/office/drawing/2010/main" val="0"/>
-              </a:ext>
-            </a:extLst>
-          </a:blip>
-          <a:stretch>
-            <a:fillRect/>
-          </a:stretch>
-        </p:blipFill>
-        <p:spPr>
-          <a:xfrm>
-            <a:off x="3017201" y="4134696"/>
-            <a:ext cx="394187" cy="394187"/>
-          </a:xfrm>
-          <a:prstGeom prst="rect">
-            <a:avLst/>
-          </a:prstGeom>
-        </p:spPr>
-      </p:pic>
-    </p:spTree>
-    <p:extLst>
-      <p:ext uri="{BB962C8B-B14F-4D97-AF65-F5344CB8AC3E}">
-        <p14:creationId xmlns:p14="http://schemas.microsoft.com/office/powerpoint/2010/main" val="1202224775"/>
-      </p:ext>
-    </p:extLst>
-  </p:cSld>
-  <p:clrMapOvr>
-    <a:masterClrMapping/>
-  </p:clrMapOvr>
-</p:sld>
-</file>
-
-<file path=ppt/slides/slide11.xml><?xml version="1.0" encoding="utf-8"?>
 <p:sld xmlns:a="http://schemas.openxmlformats.org/drawingml/2006/main" xmlns:r="http://schemas.openxmlformats.org/officeDocument/2006/relationships" xmlns:p="http://schemas.openxmlformats.org/presentationml/2006/main">
   <p:cSld>
     <p:spTree>
@@ -8938,51 +8968,38 @@
             <a:spLocks noGrp="1"/>
           </p:cNvSpPr>
           <p:nvPr>
-            <p:ph type="ctrTitle"/>
+            <p:ph type="title"/>
           </p:nvPr>
         </p:nvSpPr>
         <p:spPr/>
         <p:txBody>
-          <a:bodyPr>
-            <a:normAutofit fontScale="90000"/>
-          </a:bodyPr>
-          <a:lstStyle/>
-          <a:p>
+          <a:bodyPr/>
+          <a:lstStyle/>
+          <a:p>
+            <a:r>
+              <a:rPr lang="en-US" dirty="0" smtClean="0"/>
+              <a:t>What is </a:t>
+            </a:r>
             <a:r>
               <a:rPr lang="en-US" dirty="0" err="1" smtClean="0"/>
-              <a:t>Git</a:t>
+              <a:t>git</a:t>
             </a:r>
             <a:r>
               <a:rPr lang="en-US" dirty="0" smtClean="0"/>
-              <a:t> &amp; </a:t>
-            </a:r>
-            <a:r>
-              <a:rPr lang="en-US" dirty="0" err="1" smtClean="0"/>
-              <a:t>GitHub</a:t>
-            </a:r>
-            <a:r>
-              <a:rPr lang="en-US" dirty="0" smtClean="0"/>
-              <a:t> For Design</a:t>
-            </a:r>
-            <a:br>
-              <a:rPr lang="en-US" dirty="0" smtClean="0"/>
-            </a:br>
-            <a:r>
-              <a:rPr lang="en-US" sz="900" dirty="0" smtClean="0"/>
-              <a:t>(and some other people)</a:t>
-            </a:r>
-            <a:endParaRPr lang="en-US" sz="900" dirty="0"/>
-          </a:p>
-        </p:txBody>
-      </p:sp>
-      <p:sp>
-        <p:nvSpPr>
-          <p:cNvPr id="3" name="Subtitle 2"/>
-          <p:cNvSpPr>
-            <a:spLocks noGrp="1"/>
-          </p:cNvSpPr>
-          <p:nvPr>
-            <p:ph type="subTitle" idx="1"/>
+              <a:t>?</a:t>
+            </a:r>
+            <a:endParaRPr lang="en-US" dirty="0"/>
+          </a:p>
+        </p:txBody>
+      </p:sp>
+      <p:sp>
+        <p:nvSpPr>
+          <p:cNvPr id="3" name="Content Placeholder 2"/>
+          <p:cNvSpPr>
+            <a:spLocks noGrp="1"/>
+          </p:cNvSpPr>
+          <p:nvPr>
+            <p:ph idx="1"/>
           </p:nvPr>
         </p:nvSpPr>
         <p:spPr/>
@@ -8993,292 +9010,152 @@
           <a:lstStyle/>
           <a:p>
             <a:r>
+              <a:rPr lang="en-US" dirty="0" err="1" smtClean="0"/>
+              <a:t>Git</a:t>
+            </a:r>
+            <a:r>
               <a:rPr lang="en-US" dirty="0" smtClean="0"/>
-              <a:t>To unify and simplify how design assets are managed and hosted.</a:t>
-            </a:r>
-            <a:endParaRPr lang="en-US" dirty="0"/>
-          </a:p>
-        </p:txBody>
-      </p:sp>
-      <p:sp>
-        <p:nvSpPr>
-          <p:cNvPr id="4" name="Subtitle 2"/>
-          <p:cNvSpPr txBox="1">
-            <a:spLocks/>
-          </p:cNvSpPr>
-          <p:nvPr/>
-        </p:nvSpPr>
-        <p:spPr>
-          <a:xfrm>
-            <a:off x="-1" y="6290555"/>
-            <a:ext cx="5442857" cy="567445"/>
-          </a:xfrm>
-          <a:prstGeom prst="rect">
-            <a:avLst/>
-          </a:prstGeom>
-        </p:spPr>
-        <p:txBody>
-          <a:bodyPr vert="horz" lIns="91440" tIns="45720" rIns="91440" bIns="45720" rtlCol="0">
-            <a:normAutofit/>
-          </a:bodyPr>
-          <a:lstStyle>
-            <a:lvl1pPr marL="0" indent="0" algn="l" defTabSz="914400" rtl="0" eaLnBrk="1" latinLnBrk="0" hangingPunct="1">
-              <a:spcBef>
-                <a:spcPts val="300"/>
-              </a:spcBef>
-              <a:buClr>
-                <a:schemeClr val="accent1"/>
-              </a:buClr>
-              <a:buSzPct val="75000"/>
-              <a:buFont typeface="Wingdings" pitchFamily="2" charset="2"/>
-              <a:buNone/>
-              <a:defRPr sz="1400" kern="1200">
+              <a:t> is a file versioning system.</a:t>
+            </a:r>
+          </a:p>
+          <a:p>
+            <a:pPr lvl="1"/>
+            <a:r>
+              <a:rPr lang="en-US" dirty="0" smtClean="0"/>
+              <a:t>You overwrite the </a:t>
+            </a:r>
+            <a:r>
+              <a:rPr lang="en-US" b="1" dirty="0" smtClean="0">
                 <a:solidFill>
-                  <a:schemeClr val="tx1">
-                    <a:tint val="75000"/>
-                  </a:schemeClr>
+                  <a:srgbClr val="FF8000"/>
                 </a:solidFill>
-                <a:latin typeface="+mn-lt"/>
-                <a:ea typeface="+mn-ea"/>
-                <a:cs typeface="+mn-cs"/>
-              </a:defRPr>
-            </a:lvl1pPr>
-            <a:lvl2pPr marL="457200" indent="0" algn="ctr" defTabSz="914400" rtl="0" eaLnBrk="1" latinLnBrk="0" hangingPunct="1">
-              <a:spcBef>
-                <a:spcPts val="600"/>
-              </a:spcBef>
-              <a:buClr>
-                <a:schemeClr val="accent1">
-                  <a:lumMod val="60000"/>
-                  <a:lumOff val="40000"/>
-                </a:schemeClr>
-              </a:buClr>
-              <a:buSzPct val="75000"/>
-              <a:buFont typeface="Wingdings" pitchFamily="2" charset="2"/>
-              <a:buNone/>
-              <a:defRPr sz="1800" kern="1200">
+              </a:rPr>
+              <a:t>same </a:t>
+            </a:r>
+            <a:r>
+              <a:rPr lang="en-US" dirty="0" smtClean="0"/>
+              <a:t>file as a </a:t>
+            </a:r>
+            <a:r>
+              <a:rPr lang="en-US" b="1" dirty="0" smtClean="0">
                 <a:solidFill>
-                  <a:schemeClr val="tx1">
-                    <a:tint val="75000"/>
-                  </a:schemeClr>
+                  <a:srgbClr val="FF8000"/>
                 </a:solidFill>
-                <a:latin typeface="+mn-lt"/>
-                <a:ea typeface="+mn-ea"/>
-                <a:cs typeface="+mn-cs"/>
-              </a:defRPr>
-            </a:lvl2pPr>
-            <a:lvl3pPr marL="914400" indent="0" algn="ctr" defTabSz="914400" rtl="0" eaLnBrk="1" latinLnBrk="0" hangingPunct="1">
-              <a:spcBef>
-                <a:spcPts val="600"/>
-              </a:spcBef>
-              <a:buClr>
-                <a:schemeClr val="accent1"/>
-              </a:buClr>
-              <a:buSzPct val="75000"/>
-              <a:buFont typeface="Wingdings" pitchFamily="2" charset="2"/>
-              <a:buNone/>
-              <a:defRPr sz="1800" kern="1200">
+              </a:rPr>
+              <a:t>new version</a:t>
+            </a:r>
+            <a:r>
+              <a:rPr lang="en-US" dirty="0" smtClean="0"/>
+              <a:t>, then push your changes to a central server, which houses everything</a:t>
+            </a:r>
+          </a:p>
+          <a:p>
+            <a:pPr lvl="1"/>
+            <a:r>
+              <a:rPr lang="en-US" dirty="0" smtClean="0"/>
+              <a:t>Versions are known as </a:t>
+            </a:r>
+            <a:r>
+              <a:rPr lang="en-US" b="1" dirty="0" smtClean="0">
                 <a:solidFill>
-                  <a:schemeClr val="tx1">
-                    <a:tint val="75000"/>
-                  </a:schemeClr>
+                  <a:srgbClr val="FF8000"/>
                 </a:solidFill>
-                <a:latin typeface="+mn-lt"/>
-                <a:ea typeface="+mn-ea"/>
-                <a:cs typeface="+mn-cs"/>
-              </a:defRPr>
-            </a:lvl3pPr>
-            <a:lvl4pPr marL="1371600" indent="0" algn="ctr" defTabSz="914400" rtl="0" eaLnBrk="1" latinLnBrk="0" hangingPunct="1">
-              <a:spcBef>
-                <a:spcPts val="600"/>
-              </a:spcBef>
-              <a:buClr>
-                <a:schemeClr val="accent1">
-                  <a:lumMod val="60000"/>
-                  <a:lumOff val="40000"/>
-                </a:schemeClr>
-              </a:buClr>
-              <a:buSzPct val="75000"/>
-              <a:buFont typeface="Wingdings" pitchFamily="2" charset="2"/>
-              <a:buNone/>
-              <a:defRPr sz="1800" kern="1200">
+              </a:rPr>
+              <a:t>commits</a:t>
+            </a:r>
+            <a:r>
+              <a:rPr lang="en-US" dirty="0" smtClean="0"/>
+              <a:t>,</a:t>
+            </a:r>
+            <a:r>
+              <a:rPr lang="en-US" dirty="0"/>
+              <a:t> </a:t>
+            </a:r>
+            <a:r>
+              <a:rPr lang="en-US" dirty="0" smtClean="0"/>
+              <a:t>which create change history </a:t>
+            </a:r>
+            <a:endParaRPr lang="en-US" b="1" dirty="0" smtClean="0">
+              <a:solidFill>
+                <a:srgbClr val="FF8000"/>
+              </a:solidFill>
+            </a:endParaRPr>
+          </a:p>
+          <a:p>
+            <a:pPr lvl="1"/>
+            <a:r>
+              <a:rPr lang="en-US" dirty="0" smtClean="0"/>
+              <a:t>If two people are working on the same file, then can be automatically merged together and combine your work. Merging two peoples work creates a </a:t>
+            </a:r>
+            <a:r>
+              <a:rPr lang="en-US" b="1" dirty="0">
                 <a:solidFill>
-                  <a:schemeClr val="tx1">
-                    <a:tint val="75000"/>
-                  </a:schemeClr>
+                  <a:srgbClr val="FF8000"/>
                 </a:solidFill>
-                <a:latin typeface="+mn-lt"/>
-                <a:ea typeface="+mn-ea"/>
-                <a:cs typeface="+mn-cs"/>
-              </a:defRPr>
-            </a:lvl4pPr>
-            <a:lvl5pPr marL="1828800" indent="0" algn="ctr" defTabSz="914400" rtl="0" eaLnBrk="1" latinLnBrk="0" hangingPunct="1">
-              <a:spcBef>
-                <a:spcPts val="600"/>
-              </a:spcBef>
-              <a:buClr>
-                <a:schemeClr val="accent1"/>
-              </a:buClr>
-              <a:buSzPct val="75000"/>
-              <a:buFont typeface="Wingdings" pitchFamily="2" charset="2"/>
-              <a:buNone/>
-              <a:defRPr sz="1800" kern="1200">
+              </a:rPr>
+              <a:t>m</a:t>
+            </a:r>
+            <a:r>
+              <a:rPr lang="en-US" b="1" dirty="0" smtClean="0">
                 <a:solidFill>
-                  <a:schemeClr val="tx1">
-                    <a:tint val="75000"/>
-                  </a:schemeClr>
+                  <a:srgbClr val="FF8000"/>
                 </a:solidFill>
-                <a:latin typeface="+mn-lt"/>
-                <a:ea typeface="+mn-ea"/>
-                <a:cs typeface="+mn-cs"/>
-              </a:defRPr>
-            </a:lvl5pPr>
-            <a:lvl6pPr marL="2286000" indent="0" algn="ctr" defTabSz="914400" rtl="0" eaLnBrk="1" latinLnBrk="0" hangingPunct="1">
-              <a:spcBef>
-                <a:spcPct val="20000"/>
-              </a:spcBef>
-              <a:buClr>
-                <a:schemeClr val="accent1">
-                  <a:lumMod val="60000"/>
-                  <a:lumOff val="40000"/>
-                </a:schemeClr>
-              </a:buClr>
-              <a:buSzPct val="75000"/>
-              <a:buFont typeface="Wingdings" pitchFamily="2" charset="2"/>
-              <a:buNone/>
-              <a:defRPr lang="en-US" sz="1800" kern="1200">
+              </a:rPr>
+              <a:t>erge commit</a:t>
+            </a:r>
+            <a:r>
+              <a:rPr lang="en-US" dirty="0" smtClean="0"/>
+              <a:t>, or a </a:t>
+            </a:r>
+            <a:r>
+              <a:rPr lang="en-US" b="1" dirty="0" smtClean="0">
                 <a:solidFill>
-                  <a:schemeClr val="tx1">
-                    <a:tint val="75000"/>
-                  </a:schemeClr>
+                  <a:srgbClr val="FF8000"/>
                 </a:solidFill>
-                <a:latin typeface="+mn-lt"/>
-                <a:ea typeface="+mn-ea"/>
-                <a:cs typeface="+mn-cs"/>
-              </a:defRPr>
-            </a:lvl6pPr>
-            <a:lvl7pPr marL="2743200" indent="0" algn="ctr" defTabSz="914400" rtl="0" eaLnBrk="1" latinLnBrk="0" hangingPunct="1">
-              <a:spcBef>
-                <a:spcPct val="20000"/>
-              </a:spcBef>
-              <a:buClr>
-                <a:schemeClr val="accent1"/>
-              </a:buClr>
-              <a:buSzPct val="75000"/>
-              <a:buFont typeface="Wingdings" pitchFamily="2" charset="2"/>
-              <a:buNone/>
-              <a:defRPr lang="en-US" sz="1800" kern="1200" baseline="0">
+              </a:rPr>
+              <a:t>Pull Request</a:t>
+            </a:r>
+          </a:p>
+          <a:p>
+            <a:pPr lvl="1"/>
+            <a:r>
+              <a:rPr lang="en-US" b="1" dirty="0" smtClean="0">
                 <a:solidFill>
-                  <a:schemeClr val="tx1">
-                    <a:tint val="75000"/>
-                  </a:schemeClr>
+                  <a:srgbClr val="FF8000"/>
                 </a:solidFill>
-                <a:latin typeface="+mn-lt"/>
-                <a:ea typeface="+mn-ea"/>
-                <a:cs typeface="+mn-cs"/>
-              </a:defRPr>
-            </a:lvl7pPr>
-            <a:lvl8pPr marL="3200400" indent="0" algn="ctr" defTabSz="914400" rtl="0" eaLnBrk="1" latinLnBrk="0" hangingPunct="1">
-              <a:spcBef>
-                <a:spcPct val="20000"/>
-              </a:spcBef>
-              <a:buClr>
-                <a:schemeClr val="accent1">
-                  <a:lumMod val="60000"/>
-                  <a:lumOff val="40000"/>
-                </a:schemeClr>
-              </a:buClr>
-              <a:buSzPct val="75000"/>
-              <a:buFont typeface="Wingdings" pitchFamily="2" charset="2"/>
-              <a:buNone/>
-              <a:defRPr lang="en-US" sz="1800" kern="1200" baseline="0">
+              </a:rPr>
+              <a:t>Pull Requests</a:t>
+            </a:r>
+            <a:r>
+              <a:rPr lang="en-US" dirty="0" smtClean="0"/>
+              <a:t> create an authority chain, to denote approving assets</a:t>
+            </a:r>
+          </a:p>
+          <a:p>
+            <a:pPr lvl="1"/>
+            <a:r>
+              <a:rPr lang="en-US" b="1" dirty="0" smtClean="0">
                 <a:solidFill>
-                  <a:schemeClr val="tx1">
-                    <a:tint val="75000"/>
-                  </a:schemeClr>
+                  <a:srgbClr val="FF8000"/>
                 </a:solidFill>
-                <a:latin typeface="+mn-lt"/>
-                <a:ea typeface="+mn-ea"/>
-                <a:cs typeface="+mn-cs"/>
-              </a:defRPr>
-            </a:lvl8pPr>
-            <a:lvl9pPr marL="3657600" indent="0" algn="ctr" defTabSz="914400" rtl="0" eaLnBrk="1" latinLnBrk="0" hangingPunct="1">
-              <a:spcBef>
-                <a:spcPct val="20000"/>
-              </a:spcBef>
-              <a:buClr>
-                <a:schemeClr val="accent1"/>
-              </a:buClr>
-              <a:buSzPct val="75000"/>
-              <a:buFont typeface="Wingdings" pitchFamily="2" charset="2"/>
-              <a:buNone/>
-              <a:defRPr lang="en-US" sz="1800" kern="1200" baseline="0">
-                <a:solidFill>
-                  <a:schemeClr val="tx1">
-                    <a:tint val="75000"/>
-                  </a:schemeClr>
-                </a:solidFill>
-                <a:latin typeface="+mn-lt"/>
-                <a:ea typeface="+mn-ea"/>
-                <a:cs typeface="+mn-cs"/>
-              </a:defRPr>
-            </a:lvl9pPr>
-          </a:lstStyle>
-          <a:p>
-            <a:r>
-              <a:rPr lang="en-US" dirty="0" smtClean="0"/>
-              <a:t>I even used </a:t>
-            </a:r>
-            <a:r>
-              <a:rPr lang="en-US" dirty="0" err="1" smtClean="0"/>
-              <a:t>git</a:t>
-            </a:r>
-            <a:r>
-              <a:rPr lang="en-US" dirty="0" smtClean="0"/>
-              <a:t> to create this </a:t>
-            </a:r>
-            <a:r>
-              <a:rPr lang="en-US" dirty="0" smtClean="0"/>
-              <a:t>presentation!</a:t>
-            </a:r>
-          </a:p>
-          <a:p>
-            <a:r>
-              <a:rPr lang="en-US" dirty="0"/>
-              <a:t>https://</a:t>
-            </a:r>
-            <a:r>
-              <a:rPr lang="en-US" dirty="0" err="1"/>
-              <a:t>github.com</a:t>
-            </a:r>
-            <a:r>
-              <a:rPr lang="en-US" dirty="0"/>
-              <a:t>/</a:t>
-            </a:r>
-            <a:r>
-              <a:rPr lang="en-US" dirty="0" err="1"/>
-              <a:t>RyanCopley</a:t>
-            </a:r>
-            <a:r>
-              <a:rPr lang="en-US" dirty="0"/>
-              <a:t>/</a:t>
-            </a:r>
-            <a:r>
-              <a:rPr lang="en-US" dirty="0" err="1"/>
-              <a:t>git</a:t>
-            </a:r>
-            <a:r>
-              <a:rPr lang="en-US" dirty="0"/>
-              <a:t>-for-designers</a:t>
-            </a:r>
-            <a:endParaRPr lang="en-US" dirty="0"/>
+              </a:rPr>
+              <a:t>I will show real world examples of this stuff.</a:t>
+            </a:r>
+          </a:p>
+          <a:p>
+            <a:pPr lvl="1"/>
+            <a:endParaRPr lang="en-US" b="1" dirty="0">
+              <a:solidFill>
+                <a:srgbClr val="FF8000"/>
+              </a:solidFill>
+            </a:endParaRPr>
           </a:p>
         </p:txBody>
       </p:sp>
     </p:spTree>
     <p:extLst>
       <p:ext uri="{BB962C8B-B14F-4D97-AF65-F5344CB8AC3E}">
-        <p14:creationId xmlns:p14="http://schemas.microsoft.com/office/powerpoint/2010/main" val="770392377"/>
+        <p14:creationId xmlns:p14="http://schemas.microsoft.com/office/powerpoint/2010/main" val="3885541854"/>
       </p:ext>
     </p:extLst>
   </p:cSld>
@@ -9326,7 +9203,7 @@
             </a:r>
             <a:r>
               <a:rPr lang="en-US" dirty="0" err="1" smtClean="0"/>
-              <a:t>git</a:t>
+              <a:t>GitHub</a:t>
             </a:r>
             <a:r>
               <a:rPr lang="en-US" dirty="0" smtClean="0"/>
@@ -9348,68 +9225,47 @@
         </p:nvSpPr>
         <p:spPr/>
         <p:txBody>
-          <a:bodyPr>
-            <a:normAutofit/>
-          </a:bodyPr>
-          <a:lstStyle/>
-          <a:p>
+          <a:bodyPr/>
+          <a:lstStyle/>
+          <a:p>
+            <a:r>
+              <a:rPr lang="en-US" dirty="0" smtClean="0"/>
+              <a:t>A website that manages your </a:t>
+            </a:r>
             <a:r>
               <a:rPr lang="en-US" dirty="0" err="1" smtClean="0"/>
-              <a:t>Git</a:t>
+              <a:t>git</a:t>
             </a:r>
             <a:r>
               <a:rPr lang="en-US" dirty="0" smtClean="0"/>
-              <a:t> is a file versioning system.</a:t>
+              <a:t> repositories. </a:t>
             </a:r>
           </a:p>
           <a:p>
             <a:pPr lvl="1"/>
             <a:r>
               <a:rPr lang="en-US" dirty="0" smtClean="0"/>
-              <a:t>You overwrite the </a:t>
-            </a:r>
-            <a:r>
-              <a:rPr lang="en-US" b="1" dirty="0" smtClean="0">
-                <a:solidFill>
-                  <a:srgbClr val="FF8000"/>
-                </a:solidFill>
-              </a:rPr>
-              <a:t>same </a:t>
-            </a:r>
+              <a:t>Has managed access controls</a:t>
+            </a:r>
+          </a:p>
+          <a:p>
             <a:r>
               <a:rPr lang="en-US" dirty="0" smtClean="0"/>
-              <a:t>file as a </a:t>
-            </a:r>
-            <a:r>
-              <a:rPr lang="en-US" b="1" dirty="0" smtClean="0">
-                <a:solidFill>
-                  <a:srgbClr val="FF8000"/>
-                </a:solidFill>
-              </a:rPr>
-              <a:t>new version</a:t>
+              <a:t>You will not need to use much command line stuff, because excellent GUI tools exist.</a:t>
+            </a:r>
+          </a:p>
+          <a:p>
+            <a:r>
+              <a:rPr lang="en-US" dirty="0" err="1" smtClean="0"/>
+              <a:t>GitHub</a:t>
             </a:r>
             <a:r>
               <a:rPr lang="en-US" dirty="0" smtClean="0"/>
-              <a:t>, then push your changes to a central server, which houses everything</a:t>
-            </a:r>
-          </a:p>
-          <a:p>
-            <a:pPr lvl="1"/>
-            <a:r>
-              <a:rPr lang="en-US" dirty="0" smtClean="0"/>
-              <a:t>Versions are known as </a:t>
-            </a:r>
-            <a:r>
-              <a:rPr lang="en-US" b="1" dirty="0" smtClean="0">
-                <a:solidFill>
-                  <a:srgbClr val="FF8000"/>
-                </a:solidFill>
-              </a:rPr>
-              <a:t>commits</a:t>
-            </a:r>
-            <a:r>
-              <a:rPr lang="en-US" dirty="0" smtClean="0"/>
-              <a:t>,</a:t>
+              <a:t> is what made </a:t>
+            </a:r>
+            <a:r>
+              <a:rPr lang="en-US" dirty="0" err="1" smtClean="0"/>
+              <a:t>git</a:t>
             </a:r>
             <a:r>
               <a:rPr lang="en-US" dirty="0"/>
@@ -9417,89 +9273,21 @@
             </a:r>
             <a:r>
               <a:rPr lang="en-US" dirty="0" smtClean="0"/>
-              <a:t>which create change history </a:t>
-            </a:r>
-            <a:endParaRPr lang="en-US" b="1" dirty="0" smtClean="0">
-              <a:solidFill>
-                <a:srgbClr val="FF8000"/>
-              </a:solidFill>
-            </a:endParaRPr>
-          </a:p>
-          <a:p>
-            <a:pPr lvl="1"/>
-            <a:r>
-              <a:rPr lang="en-US" dirty="0" smtClean="0"/>
-              <a:t>If two people are working on the same file, then can be automatically merged together and combine your work. Merging two peoples work creates a </a:t>
-            </a:r>
-            <a:r>
-              <a:rPr lang="en-US" b="1" dirty="0">
-                <a:solidFill>
-                  <a:srgbClr val="FF8000"/>
-                </a:solidFill>
-              </a:rPr>
-              <a:t>m</a:t>
-            </a:r>
-            <a:r>
-              <a:rPr lang="en-US" b="1" dirty="0" smtClean="0">
-                <a:solidFill>
-                  <a:srgbClr val="FF8000"/>
-                </a:solidFill>
-              </a:rPr>
-              <a:t>erge commit</a:t>
-            </a:r>
-            <a:r>
-              <a:rPr lang="en-US" dirty="0" smtClean="0"/>
-              <a:t>, or a </a:t>
-            </a:r>
-            <a:r>
-              <a:rPr lang="en-US" b="1" dirty="0" smtClean="0">
-                <a:solidFill>
-                  <a:srgbClr val="FF8000"/>
-                </a:solidFill>
-              </a:rPr>
-              <a:t>Pull Request</a:t>
-            </a:r>
-          </a:p>
-          <a:p>
-            <a:pPr lvl="1"/>
-            <a:r>
-              <a:rPr lang="en-US" b="1" dirty="0" smtClean="0">
-                <a:solidFill>
-                  <a:srgbClr val="FF8000"/>
-                </a:solidFill>
-              </a:rPr>
-              <a:t>Pull Requests</a:t>
-            </a:r>
-            <a:r>
-              <a:rPr lang="en-US" dirty="0" smtClean="0"/>
-              <a:t> create an authority chain, to denote approving assets</a:t>
-            </a:r>
-          </a:p>
-          <a:p>
-            <a:pPr lvl="1"/>
-            <a:r>
-              <a:rPr lang="en-US" b="1" dirty="0" smtClean="0">
-                <a:solidFill>
-                  <a:srgbClr val="FF8000"/>
-                </a:solidFill>
-              </a:rPr>
-              <a:t>I will show real world examples of this stuff.</a:t>
-            </a:r>
-          </a:p>
-          <a:p>
-            <a:pPr lvl="1"/>
-            <a:endParaRPr lang="en-US" b="1" dirty="0">
-              <a:solidFill>
-                <a:srgbClr val="FF8000"/>
-              </a:solidFill>
-            </a:endParaRPr>
+              <a:t>awesome for designers.</a:t>
+            </a:r>
+          </a:p>
+          <a:p>
+            <a:pPr marL="0" indent="0">
+              <a:buNone/>
+            </a:pPr>
+            <a:endParaRPr lang="en-US" dirty="0" smtClean="0"/>
           </a:p>
         </p:txBody>
       </p:sp>
     </p:spTree>
     <p:extLst>
       <p:ext uri="{BB962C8B-B14F-4D97-AF65-F5344CB8AC3E}">
-        <p14:creationId xmlns:p14="http://schemas.microsoft.com/office/powerpoint/2010/main" val="3885541854"/>
+        <p14:creationId xmlns:p14="http://schemas.microsoft.com/office/powerpoint/2010/main" val="1103122778"/>
       </p:ext>
     </p:extLst>
   </p:cSld>
@@ -9543,38 +9331,74 @@
           <a:p>
             <a:r>
               <a:rPr lang="en-US" dirty="0" smtClean="0"/>
-              <a:t>What is </a:t>
-            </a:r>
-            <a:r>
-              <a:rPr lang="en-US" dirty="0" err="1" smtClean="0"/>
-              <a:t>GitHub</a:t>
-            </a:r>
+              <a:t>How does this help designers?</a:t>
+            </a:r>
+            <a:endParaRPr lang="en-US" dirty="0"/>
+          </a:p>
+        </p:txBody>
+      </p:sp>
+      <p:sp>
+        <p:nvSpPr>
+          <p:cNvPr id="3" name="Content Placeholder 2"/>
+          <p:cNvSpPr>
+            <a:spLocks noGrp="1"/>
+          </p:cNvSpPr>
+          <p:nvPr>
+            <p:ph idx="1"/>
+          </p:nvPr>
+        </p:nvSpPr>
+        <p:spPr>
+          <a:xfrm>
+            <a:off x="498474" y="1981200"/>
+            <a:ext cx="7556313" cy="4788877"/>
+          </a:xfrm>
+        </p:spPr>
+        <p:txBody>
+          <a:bodyPr>
+            <a:normAutofit/>
+          </a:bodyPr>
+          <a:lstStyle/>
+          <a:p>
             <a:r>
               <a:rPr lang="en-US" dirty="0" smtClean="0"/>
-              <a:t>?</a:t>
-            </a:r>
-            <a:endParaRPr lang="en-US" dirty="0"/>
-          </a:p>
-        </p:txBody>
-      </p:sp>
-      <p:sp>
-        <p:nvSpPr>
-          <p:cNvPr id="3" name="Content Placeholder 2"/>
-          <p:cNvSpPr>
-            <a:spLocks noGrp="1"/>
-          </p:cNvSpPr>
-          <p:nvPr>
-            <p:ph idx="1"/>
-          </p:nvPr>
-        </p:nvSpPr>
-        <p:spPr/>
-        <p:txBody>
-          <a:bodyPr/>
-          <a:lstStyle/>
+              <a:t>Hosting for your design assets, yay </a:t>
+            </a:r>
+            <a:r>
+              <a:rPr lang="en-US" dirty="0" smtClean="0">
+                <a:sym typeface="Wingdings"/>
+              </a:rPr>
+              <a:t></a:t>
+            </a:r>
+            <a:endParaRPr lang="en-US" dirty="0" smtClean="0"/>
+          </a:p>
           <a:p>
             <a:r>
               <a:rPr lang="en-US" dirty="0" smtClean="0"/>
-              <a:t>A website that manages your </a:t>
+              <a:t>Unlimited undo's, even from other designers undo history</a:t>
+            </a:r>
+          </a:p>
+          <a:p>
+            <a:pPr lvl="1"/>
+            <a:r>
+              <a:rPr lang="en-US" dirty="0" smtClean="0"/>
+              <a:t>(Sort of, but trust me, it’s awesome</a:t>
+            </a:r>
+            <a:r>
+              <a:rPr lang="en-US" dirty="0" smtClean="0"/>
+              <a:t>)</a:t>
+            </a:r>
+          </a:p>
+          <a:p>
+            <a:r>
+              <a:rPr lang="en-US" dirty="0" smtClean="0"/>
+              <a:t>Branching</a:t>
+            </a:r>
+            <a:endParaRPr lang="en-US" dirty="0" smtClean="0"/>
+          </a:p>
+          <a:p>
+            <a:r>
+              <a:rPr lang="en-US" dirty="0" smtClean="0"/>
+              <a:t>It is very easy to link a JIRA ticket in </a:t>
             </a:r>
             <a:r>
               <a:rPr lang="en-US" dirty="0" err="1" smtClean="0"/>
@@ -9582,48 +9406,34 @@
             </a:r>
             <a:r>
               <a:rPr lang="en-US" dirty="0" smtClean="0"/>
-              <a:t> repositories. </a:t>
-            </a:r>
-          </a:p>
-          <a:p>
-            <a:pPr lvl="1"/>
+              <a:t>, associating your work </a:t>
+            </a:r>
+            <a:r>
+              <a:rPr lang="en-US" dirty="0"/>
+              <a:t>with </a:t>
+            </a:r>
             <a:r>
               <a:rPr lang="en-US" dirty="0" smtClean="0"/>
-              <a:t>Has managed access controls</a:t>
+              <a:t>JIRA</a:t>
             </a:r>
           </a:p>
           <a:p>
             <a:r>
               <a:rPr lang="en-US" dirty="0" smtClean="0"/>
-              <a:t>You will not need to use much command line stuff, because excellent GUI tools exist.</a:t>
-            </a:r>
-          </a:p>
-          <a:p>
-            <a:r>
-              <a:rPr lang="en-US" dirty="0" err="1" smtClean="0"/>
-              <a:t>GitHub</a:t>
-            </a:r>
+              <a:t>Allows any designer to work on any project, since PSDs will be centrally stored.</a:t>
+            </a:r>
+          </a:p>
+          <a:p>
             <a:r>
               <a:rPr lang="en-US" dirty="0" smtClean="0"/>
-              <a:t> is what made </a:t>
-            </a:r>
-            <a:r>
-              <a:rPr lang="en-US" dirty="0" err="1" smtClean="0"/>
-              <a:t>git</a:t>
+              <a:t>It’s </a:t>
             </a:r>
             <a:r>
               <a:rPr lang="en-US" dirty="0"/>
-              <a:t> </a:t>
-            </a:r>
-            <a:r>
-              <a:rPr lang="en-US" dirty="0" smtClean="0"/>
-              <a:t>awesome for designers.</a:t>
-            </a:r>
-          </a:p>
-          <a:p>
-            <a:pPr marL="0" indent="0">
-              <a:buNone/>
-            </a:pPr>
+              <a:t>free for us (Thank Gannett Digital)</a:t>
+            </a:r>
+          </a:p>
+          <a:p>
             <a:endParaRPr lang="en-US" dirty="0" smtClean="0"/>
           </a:p>
         </p:txBody>
@@ -9631,7 +9441,7 @@
     </p:spTree>
     <p:extLst>
       <p:ext uri="{BB962C8B-B14F-4D97-AF65-F5344CB8AC3E}">
-        <p14:creationId xmlns:p14="http://schemas.microsoft.com/office/powerpoint/2010/main" val="1103122778"/>
+        <p14:creationId xmlns:p14="http://schemas.microsoft.com/office/powerpoint/2010/main" val="3173516093"/>
       </p:ext>
     </p:extLst>
   </p:cSld>
@@ -9670,12 +9480,18 @@
         </p:nvSpPr>
         <p:spPr/>
         <p:txBody>
-          <a:bodyPr/>
+          <a:bodyPr>
+            <a:normAutofit fontScale="90000"/>
+          </a:bodyPr>
           <a:lstStyle/>
           <a:p>
             <a:r>
               <a:rPr lang="en-US" dirty="0" smtClean="0"/>
-              <a:t>How does this help designers?</a:t>
+              <a:t>What advantages does this have over JIRA, ZIPs, </a:t>
+            </a:r>
+            <a:r>
+              <a:rPr lang="en-US" dirty="0" err="1" smtClean="0"/>
+              <a:t>dropbox</a:t>
             </a:r>
             <a:endParaRPr lang="en-US" dirty="0"/>
           </a:p>
@@ -9691,93 +9507,100 @@
             <p:ph idx="1"/>
           </p:nvPr>
         </p:nvSpPr>
-        <p:spPr>
-          <a:xfrm>
-            <a:off x="498474" y="1981200"/>
-            <a:ext cx="7556313" cy="4788877"/>
-          </a:xfrm>
-        </p:spPr>
+        <p:spPr/>
         <p:txBody>
           <a:bodyPr>
-            <a:normAutofit/>
+            <a:normAutofit fontScale="92500" lnSpcReduction="20000"/>
           </a:bodyPr>
           <a:lstStyle/>
           <a:p>
             <a:r>
               <a:rPr lang="en-US" dirty="0" smtClean="0"/>
-              <a:t>Hosting for your design assets, yay </a:t>
+              <a:t>All design assets are centrally located</a:t>
+            </a:r>
+          </a:p>
+          <a:p>
+            <a:r>
+              <a:rPr lang="en-US" dirty="0" smtClean="0"/>
+              <a:t>A very clear understanding of what assets are approved</a:t>
+            </a:r>
+          </a:p>
+          <a:p>
+            <a:r>
+              <a:rPr lang="en-US" dirty="0" smtClean="0"/>
+              <a:t>No more file size upload restrictions (JIRA)</a:t>
+            </a:r>
+          </a:p>
+          <a:p>
+            <a:r>
+              <a:rPr lang="en-US" dirty="0" smtClean="0"/>
+              <a:t>Zipping stuff takes time, and causes confusion</a:t>
+            </a:r>
+          </a:p>
+          <a:p>
+            <a:pPr lvl="1"/>
+            <a:r>
+              <a:rPr lang="en-US" dirty="0" smtClean="0"/>
+              <a:t>This zip only has a subsection, that zip has the whole thing, this zip is named final_2.zip,  </a:t>
+            </a:r>
+            <a:r>
+              <a:rPr lang="en-US" dirty="0" err="1" smtClean="0"/>
+              <a:t>etc</a:t>
+            </a:r>
+            <a:endParaRPr lang="en-US" dirty="0" smtClean="0"/>
+          </a:p>
+          <a:p>
+            <a:pPr lvl="1"/>
+            <a:r>
+              <a:rPr lang="en-US" dirty="0" smtClean="0"/>
+              <a:t>You can’t see “inside” a zip unless you download and extract it</a:t>
+            </a:r>
+            <a:endParaRPr lang="en-US" dirty="0" smtClean="0"/>
+          </a:p>
+          <a:p>
+            <a:r>
+              <a:rPr lang="en-US" dirty="0" smtClean="0"/>
+              <a:t>There are file ownership issues with </a:t>
+            </a:r>
+            <a:r>
+              <a:rPr lang="en-US" dirty="0" err="1" smtClean="0"/>
+              <a:t>DropBox</a:t>
+            </a:r>
+            <a:endParaRPr lang="en-US" dirty="0" smtClean="0"/>
+          </a:p>
+          <a:p>
+            <a:pPr lvl="1"/>
+            <a:r>
+              <a:rPr lang="en-US" dirty="0" smtClean="0"/>
+              <a:t>We can’t see inside your </a:t>
+            </a:r>
+            <a:r>
+              <a:rPr lang="en-US" dirty="0" err="1" smtClean="0"/>
+              <a:t>dropbox</a:t>
+            </a:r>
+            <a:r>
+              <a:rPr lang="en-US" dirty="0" smtClean="0"/>
+              <a:t> easily </a:t>
             </a:r>
             <a:r>
               <a:rPr lang="en-US" dirty="0" smtClean="0">
                 <a:sym typeface="Wingdings"/>
               </a:rPr>
-              <a:t></a:t>
+              <a:t> </a:t>
             </a:r>
             <a:endParaRPr lang="en-US" dirty="0" smtClean="0"/>
           </a:p>
           <a:p>
             <a:r>
               <a:rPr lang="en-US" dirty="0" smtClean="0"/>
-              <a:t>Unlimited undo's, even from other designers undo history</a:t>
-            </a:r>
-          </a:p>
-          <a:p>
-            <a:pPr lvl="1"/>
-            <a:r>
-              <a:rPr lang="en-US" dirty="0" smtClean="0"/>
-              <a:t>(Sort of, but trust me, it’s awesome</a:t>
-            </a:r>
-            <a:r>
-              <a:rPr lang="en-US" dirty="0" smtClean="0"/>
-              <a:t>)</a:t>
-            </a:r>
-          </a:p>
-          <a:p>
-            <a:r>
-              <a:rPr lang="en-US" dirty="0" smtClean="0"/>
-              <a:t>Branching</a:t>
-            </a:r>
-            <a:endParaRPr lang="en-US" dirty="0" smtClean="0"/>
-          </a:p>
-          <a:p>
-            <a:r>
-              <a:rPr lang="en-US" dirty="0" smtClean="0"/>
-              <a:t>It is very easy to link a JIRA ticket in </a:t>
-            </a:r>
-            <a:r>
-              <a:rPr lang="en-US" dirty="0" err="1" smtClean="0"/>
-              <a:t>git</a:t>
-            </a:r>
-            <a:r>
-              <a:rPr lang="en-US" dirty="0" smtClean="0"/>
-              <a:t>, associating your work </a:t>
-            </a:r>
-            <a:r>
-              <a:rPr lang="en-US" dirty="0"/>
-              <a:t>with </a:t>
-            </a:r>
-            <a:r>
-              <a:rPr lang="en-US" dirty="0" smtClean="0"/>
-              <a:t>JIRA</a:t>
-            </a:r>
-          </a:p>
-          <a:p>
-            <a:r>
-              <a:rPr lang="en-US" dirty="0" smtClean="0"/>
-              <a:t>Allows any designer to work on any project, since PSDs will be centrally stored.</a:t>
-            </a:r>
-          </a:p>
-          <a:p>
-            <a:r>
-              <a:rPr lang="en-US" dirty="0" smtClean="0"/>
-              <a:t>It’s </a:t>
-            </a:r>
-            <a:r>
-              <a:rPr lang="en-US" dirty="0"/>
-              <a:t>free for us (Thank Gannett Digital)</a:t>
-            </a:r>
-          </a:p>
-          <a:p>
+              <a:t>All of Gannett Digital uses it for code and configurations, so design is the next step! </a:t>
+            </a:r>
+            <a:r>
+              <a:rPr lang="en-US" dirty="0" smtClean="0">
+                <a:sym typeface="Wingdings"/>
+              </a:rPr>
+              <a:t> </a:t>
+            </a:r>
             <a:endParaRPr lang="en-US" dirty="0" smtClean="0"/>
           </a:p>
         </p:txBody>
@@ -9785,7 +9608,7 @@
     </p:spTree>
     <p:extLst>
       <p:ext uri="{BB962C8B-B14F-4D97-AF65-F5344CB8AC3E}">
-        <p14:creationId xmlns:p14="http://schemas.microsoft.com/office/powerpoint/2010/main" val="3173516093"/>
+        <p14:creationId xmlns:p14="http://schemas.microsoft.com/office/powerpoint/2010/main" val="1011556746"/>
       </p:ext>
     </p:extLst>
   </p:cSld>
@@ -9824,68 +9647,54 @@
         </p:nvSpPr>
         <p:spPr/>
         <p:txBody>
-          <a:bodyPr>
-            <a:normAutofit fontScale="90000"/>
-          </a:bodyPr>
+          <a:bodyPr/>
           <a:lstStyle/>
           <a:p>
             <a:r>
               <a:rPr lang="en-US" dirty="0" smtClean="0"/>
-              <a:t>What advantages does this have over JIRA, ZIPs, </a:t>
+              <a:t>History</a:t>
+            </a:r>
+            <a:endParaRPr lang="en-US" dirty="0"/>
+          </a:p>
+        </p:txBody>
+      </p:sp>
+      <p:sp>
+        <p:nvSpPr>
+          <p:cNvPr id="3" name="Content Placeholder 2"/>
+          <p:cNvSpPr>
+            <a:spLocks noGrp="1"/>
+          </p:cNvSpPr>
+          <p:nvPr>
+            <p:ph idx="1"/>
+          </p:nvPr>
+        </p:nvSpPr>
+        <p:spPr>
+          <a:xfrm>
+            <a:off x="498474" y="1600200"/>
+            <a:ext cx="7556313" cy="4525963"/>
+          </a:xfrm>
+        </p:spPr>
+        <p:txBody>
+          <a:bodyPr/>
+          <a:lstStyle/>
+          <a:p>
+            <a:r>
+              <a:rPr lang="en-US" dirty="0" smtClean="0"/>
+              <a:t>“undo” history, but built into </a:t>
             </a:r>
             <a:r>
               <a:rPr lang="en-US" dirty="0" err="1" smtClean="0"/>
-              <a:t>dropbox</a:t>
-            </a:r>
-            <a:endParaRPr lang="en-US" dirty="0"/>
-          </a:p>
-        </p:txBody>
-      </p:sp>
-      <p:sp>
-        <p:nvSpPr>
-          <p:cNvPr id="3" name="Content Placeholder 2"/>
-          <p:cNvSpPr>
-            <a:spLocks noGrp="1"/>
-          </p:cNvSpPr>
-          <p:nvPr>
-            <p:ph idx="1"/>
-          </p:nvPr>
-        </p:nvSpPr>
-        <p:spPr/>
-        <p:txBody>
-          <a:bodyPr>
-            <a:normAutofit fontScale="92500" lnSpcReduction="20000"/>
-          </a:bodyPr>
-          <a:lstStyle/>
-          <a:p>
+              <a:t>git</a:t>
+            </a:r>
             <a:r>
               <a:rPr lang="en-US" dirty="0" smtClean="0"/>
-              <a:t>All design assets are centrally located</a:t>
+              <a:t>!</a:t>
             </a:r>
           </a:p>
           <a:p>
             <a:r>
               <a:rPr lang="en-US" dirty="0" smtClean="0"/>
-              <a:t>A very clear understanding of what assets are approved</a:t>
-            </a:r>
-          </a:p>
-          <a:p>
-            <a:r>
-              <a:rPr lang="en-US" dirty="0" smtClean="0"/>
-              <a:t>No more file size upload restrictions (JIRA)</a:t>
-            </a:r>
-          </a:p>
-          <a:p>
-            <a:r>
-              <a:rPr lang="en-US" dirty="0" smtClean="0"/>
-              <a:t>Zipping stuff takes time, and causes confusion</a:t>
-            </a:r>
-          </a:p>
-          <a:p>
-            <a:pPr lvl="1"/>
-            <a:r>
-              <a:rPr lang="en-US" dirty="0" smtClean="0"/>
-              <a:t>This zip only has a subsection, that zip has the whole thing, this zip is named final_2.zip,  </a:t>
+              <a:t>Can span between days, between Photoshop crashing, </a:t>
             </a:r>
             <a:r>
               <a:rPr lang="en-US" dirty="0" err="1" smtClean="0"/>
@@ -9894,65 +9703,30 @@
             <a:endParaRPr lang="en-US" dirty="0" smtClean="0"/>
           </a:p>
           <a:p>
-            <a:pPr lvl="1"/>
             <a:r>
               <a:rPr lang="en-US" dirty="0" smtClean="0"/>
-              <a:t>You can’t see “inside” a zip unless you download and extract it</a:t>
-            </a:r>
-            <a:endParaRPr lang="en-US" dirty="0" smtClean="0"/>
+              <a:t>Is as simple as pushing a button (and maybe a description)</a:t>
+            </a:r>
           </a:p>
           <a:p>
             <a:r>
               <a:rPr lang="en-US" dirty="0" smtClean="0"/>
-              <a:t>There are file ownership issues with </a:t>
-            </a:r>
-            <a:r>
-              <a:rPr lang="en-US" dirty="0" err="1" smtClean="0"/>
-              <a:t>DropBox</a:t>
-            </a:r>
-            <a:endParaRPr lang="en-US" dirty="0" smtClean="0"/>
-          </a:p>
-          <a:p>
-            <a:pPr lvl="1"/>
+              <a:t>When you push the button, the work you’ve done is “written” into the history of the repository, and you can go back to this point at any time</a:t>
+            </a:r>
+          </a:p>
+          <a:p>
             <a:r>
               <a:rPr lang="en-US" dirty="0" smtClean="0"/>
-              <a:t>We can’t see inside your </a:t>
-            </a:r>
-            <a:r>
-              <a:rPr lang="en-US" dirty="0" err="1" smtClean="0"/>
-              <a:t>dropbox</a:t>
-            </a:r>
-            <a:r>
-              <a:rPr lang="en-US" dirty="0" smtClean="0"/>
-              <a:t> easily </a:t>
-            </a:r>
-            <a:r>
-              <a:rPr lang="en-US" dirty="0" smtClean="0">
-                <a:sym typeface="Wingdings"/>
-              </a:rPr>
-              <a:t> </a:t>
-            </a:r>
-            <a:endParaRPr lang="en-US" dirty="0" smtClean="0"/>
-          </a:p>
-          <a:p>
-            <a:r>
-              <a:rPr lang="en-US" dirty="0" smtClean="0"/>
-              <a:t>All of Gannett Digital uses it for code and configurations, so design is the next step! </a:t>
-            </a:r>
-            <a:r>
-              <a:rPr lang="en-US" dirty="0" smtClean="0">
-                <a:sym typeface="Wingdings"/>
-              </a:rPr>
-              <a:t> </a:t>
-            </a:r>
-            <a:endParaRPr lang="en-US" dirty="0" smtClean="0"/>
+              <a:t>History is attached to your name, so we can see who did what work.</a:t>
+            </a:r>
+            <a:endParaRPr lang="en-US" dirty="0"/>
           </a:p>
         </p:txBody>
       </p:sp>
     </p:spTree>
     <p:extLst>
       <p:ext uri="{BB962C8B-B14F-4D97-AF65-F5344CB8AC3E}">
-        <p14:creationId xmlns:p14="http://schemas.microsoft.com/office/powerpoint/2010/main" val="1011556746"/>
+        <p14:creationId xmlns:p14="http://schemas.microsoft.com/office/powerpoint/2010/main" val="1090168707"/>
       </p:ext>
     </p:extLst>
   </p:cSld>
@@ -9996,81 +9770,46 @@
           <a:p>
             <a:r>
               <a:rPr lang="en-US" dirty="0" smtClean="0"/>
-              <a:t>History</a:t>
+              <a:t>Real world example</a:t>
             </a:r>
             <a:endParaRPr lang="en-US" dirty="0"/>
           </a:p>
         </p:txBody>
       </p:sp>
-      <p:sp>
-        <p:nvSpPr>
-          <p:cNvPr id="3" name="Content Placeholder 2"/>
-          <p:cNvSpPr>
-            <a:spLocks noGrp="1"/>
-          </p:cNvSpPr>
-          <p:nvPr>
-            <p:ph idx="1"/>
-          </p:nvPr>
-        </p:nvSpPr>
-        <p:spPr>
-          <a:xfrm>
-            <a:off x="498474" y="1600200"/>
-            <a:ext cx="7556313" cy="4525963"/>
-          </a:xfrm>
-        </p:spPr>
-        <p:txBody>
-          <a:bodyPr/>
-          <a:lstStyle/>
-          <a:p>
-            <a:r>
-              <a:rPr lang="en-US" dirty="0" smtClean="0"/>
-              <a:t>“undo” history, but built into </a:t>
-            </a:r>
-            <a:r>
-              <a:rPr lang="en-US" dirty="0" err="1" smtClean="0"/>
-              <a:t>git</a:t>
-            </a:r>
-            <a:r>
-              <a:rPr lang="en-US" dirty="0" smtClean="0"/>
-              <a:t>!</a:t>
-            </a:r>
-          </a:p>
-          <a:p>
-            <a:r>
-              <a:rPr lang="en-US" dirty="0" smtClean="0"/>
-              <a:t>Can span between days, between Photoshop crashing, </a:t>
-            </a:r>
-            <a:r>
-              <a:rPr lang="en-US" dirty="0" err="1" smtClean="0"/>
-              <a:t>etc</a:t>
-            </a:r>
-            <a:endParaRPr lang="en-US" dirty="0" smtClean="0"/>
-          </a:p>
-          <a:p>
-            <a:r>
-              <a:rPr lang="en-US" dirty="0" smtClean="0"/>
-              <a:t>Is as simple as pushing a button (and maybe a description)</a:t>
-            </a:r>
-          </a:p>
-          <a:p>
-            <a:r>
-              <a:rPr lang="en-US" dirty="0" smtClean="0"/>
-              <a:t>When you push the button, the work you’ve done is “written” into the history of the repository, and you can go back to this point at any time</a:t>
-            </a:r>
-          </a:p>
-          <a:p>
-            <a:r>
-              <a:rPr lang="en-US" dirty="0" smtClean="0"/>
-              <a:t>History is attached to your name, so we can see who did what work.</a:t>
-            </a:r>
-            <a:endParaRPr lang="en-US" dirty="0"/>
-          </a:p>
-        </p:txBody>
-      </p:sp>
+      <p:pic>
+        <p:nvPicPr>
+          <p:cNvPr id="4" name="Picture 3" descr="Screen Shot 2015-01-26 at 4.55.20 PM.png"/>
+          <p:cNvPicPr>
+            <a:picLocks noChangeAspect="1"/>
+          </p:cNvPicPr>
+          <p:nvPr/>
+        </p:nvPicPr>
+        <p:blipFill>
+          <a:blip r:embed="rId2">
+            <a:extLst>
+              <a:ext uri="{28A0092B-C50C-407E-A947-70E740481C1C}">
+                <a14:useLocalDpi xmlns:a14="http://schemas.microsoft.com/office/drawing/2010/main" val="0"/>
+              </a:ext>
+            </a:extLst>
+          </a:blip>
+          <a:stretch>
+            <a:fillRect/>
+          </a:stretch>
+        </p:blipFill>
+        <p:spPr>
+          <a:xfrm>
+            <a:off x="254000" y="1052286"/>
+            <a:ext cx="6042804" cy="6858000"/>
+          </a:xfrm>
+          <a:prstGeom prst="rect">
+            <a:avLst/>
+          </a:prstGeom>
+        </p:spPr>
+      </p:pic>
     </p:spTree>
     <p:extLst>
       <p:ext uri="{BB962C8B-B14F-4D97-AF65-F5344CB8AC3E}">
-        <p14:creationId xmlns:p14="http://schemas.microsoft.com/office/powerpoint/2010/main" val="1090168707"/>
+        <p14:creationId xmlns:p14="http://schemas.microsoft.com/office/powerpoint/2010/main" val="4207486474"/>
       </p:ext>
     </p:extLst>
   </p:cSld>
@@ -10114,15 +9853,69 @@
           <a:p>
             <a:r>
               <a:rPr lang="en-US" dirty="0" smtClean="0"/>
-              <a:t>Real world example</a:t>
+              <a:t>Branching</a:t>
             </a:r>
             <a:endParaRPr lang="en-US" dirty="0"/>
+          </a:p>
+        </p:txBody>
+      </p:sp>
+      <p:sp>
+        <p:nvSpPr>
+          <p:cNvPr id="3" name="Content Placeholder 2"/>
+          <p:cNvSpPr>
+            <a:spLocks noGrp="1"/>
+          </p:cNvSpPr>
+          <p:nvPr>
+            <p:ph idx="1"/>
+          </p:nvPr>
+        </p:nvSpPr>
+        <p:spPr>
+          <a:xfrm>
+            <a:off x="498474" y="1599174"/>
+            <a:ext cx="6071043" cy="3736040"/>
+          </a:xfrm>
+        </p:spPr>
+        <p:txBody>
+          <a:bodyPr/>
+          <a:lstStyle/>
+          <a:p>
+            <a:r>
+              <a:rPr lang="en-US" dirty="0" smtClean="0"/>
+              <a:t>Branching</a:t>
+            </a:r>
+          </a:p>
+          <a:p>
+            <a:pPr lvl="1"/>
+            <a:r>
+              <a:rPr lang="en-US" dirty="0" smtClean="0"/>
+              <a:t>Side by side versions, which stem from a common parent</a:t>
+            </a:r>
+          </a:p>
+          <a:p>
+            <a:pPr lvl="1"/>
+            <a:r>
+              <a:rPr lang="en-US" dirty="0" smtClean="0"/>
+              <a:t>Allows you to make MULTIPLE versions of the same file to present</a:t>
+            </a:r>
+          </a:p>
+          <a:p>
+            <a:pPr lvl="1"/>
+            <a:r>
+              <a:rPr lang="en-US" dirty="0" smtClean="0"/>
+              <a:t>Useful when you don’t have concrete ideas and need some room for creative freedom</a:t>
+            </a:r>
+          </a:p>
+          <a:p>
+            <a:endParaRPr lang="en-US" dirty="0" smtClean="0"/>
+          </a:p>
+          <a:p>
+            <a:endParaRPr lang="en-US" dirty="0" smtClean="0"/>
           </a:p>
         </p:txBody>
       </p:sp>
       <p:pic>
         <p:nvPicPr>
-          <p:cNvPr id="4" name="Picture 3" descr="Screen Shot 2015-01-26 at 4.55.20 PM.png"/>
+          <p:cNvPr id="4" name="Picture 3" descr="Screen Shot 2015-01-26 at 3.23.33 PM.png"/>
           <p:cNvPicPr>
             <a:picLocks noChangeAspect="1"/>
           </p:cNvPicPr>
@@ -10142,8 +9935,8 @@
         </p:blipFill>
         <p:spPr>
           <a:xfrm>
-            <a:off x="254000" y="1052286"/>
-            <a:ext cx="6042804" cy="6858000"/>
+            <a:off x="6569517" y="2842312"/>
+            <a:ext cx="2508820" cy="3780509"/>
           </a:xfrm>
           <a:prstGeom prst="rect">
             <a:avLst/>
@@ -10153,7 +9946,7 @@
     </p:spTree>
     <p:extLst>
       <p:ext uri="{BB962C8B-B14F-4D97-AF65-F5344CB8AC3E}">
-        <p14:creationId xmlns:p14="http://schemas.microsoft.com/office/powerpoint/2010/main" val="4207486474"/>
+        <p14:creationId xmlns:p14="http://schemas.microsoft.com/office/powerpoint/2010/main" val="1885091767"/>
       </p:ext>
     </p:extLst>
   </p:cSld>
@@ -10197,7 +9990,7 @@
           <a:p>
             <a:r>
               <a:rPr lang="en-US" dirty="0" smtClean="0"/>
-              <a:t>Branching</a:t>
+              <a:t>Real world example of branching</a:t>
             </a:r>
             <a:endParaRPr lang="en-US" dirty="0"/>
           </a:p>
@@ -10213,53 +10006,177 @@
             <p:ph idx="1"/>
           </p:nvPr>
         </p:nvSpPr>
-        <p:spPr>
-          <a:xfrm>
-            <a:off x="498474" y="1599174"/>
-            <a:ext cx="6071043" cy="3736040"/>
-          </a:xfrm>
-        </p:spPr>
-        <p:txBody>
-          <a:bodyPr/>
-          <a:lstStyle/>
-          <a:p>
+        <p:spPr/>
+        <p:txBody>
+          <a:bodyPr>
+            <a:normAutofit/>
+          </a:bodyPr>
+          <a:lstStyle/>
+          <a:p>
+            <a:pPr lvl="1"/>
             <a:r>
               <a:rPr lang="en-US" dirty="0" smtClean="0"/>
-              <a:t>Branching</a:t>
+              <a:t>Context: We have a splash screen which is currently </a:t>
+            </a:r>
+            <a:r>
+              <a:rPr lang="en-US" dirty="0" smtClean="0">
+                <a:solidFill>
+                  <a:srgbClr val="FF0000"/>
+                </a:solidFill>
+              </a:rPr>
+              <a:t>RED</a:t>
+            </a:r>
+            <a:r>
+              <a:rPr lang="en-US" dirty="0" smtClean="0"/>
+              <a:t>, and has been approved and is in the master repo.</a:t>
             </a:r>
           </a:p>
           <a:p>
             <a:pPr lvl="1"/>
             <a:r>
               <a:rPr lang="en-US" dirty="0" smtClean="0"/>
-              <a:t>Side by side versions, which stem from a common parent</a:t>
+              <a:t>PM</a:t>
+            </a:r>
+            <a:r>
+              <a:rPr lang="en-US" dirty="0"/>
+              <a:t>: “I know you made a red splash screen, but I want to see orange and brown to see if they’re better. Can you do both and let me see?”</a:t>
             </a:r>
           </a:p>
           <a:p>
             <a:pPr lvl="1"/>
             <a:r>
+              <a:rPr lang="en-US" dirty="0"/>
+              <a:t>Two branches, an </a:t>
+            </a:r>
+            <a:r>
+              <a:rPr lang="en-US" dirty="0">
+                <a:solidFill>
+                  <a:srgbClr val="FF6600"/>
+                </a:solidFill>
+              </a:rPr>
+              <a:t>ORANGE</a:t>
+            </a:r>
+            <a:r>
+              <a:rPr lang="en-US" dirty="0"/>
+              <a:t> branch, and a </a:t>
+            </a:r>
+            <a:r>
+              <a:rPr lang="en-US" dirty="0">
+                <a:solidFill>
+                  <a:srgbClr val="996633"/>
+                </a:solidFill>
+              </a:rPr>
+              <a:t>BROWN</a:t>
+            </a:r>
+            <a:r>
+              <a:rPr lang="en-US" dirty="0"/>
+              <a:t> branch, which are parents of </a:t>
+            </a:r>
+            <a:r>
+              <a:rPr lang="en-US" dirty="0" smtClean="0">
+                <a:solidFill>
+                  <a:srgbClr val="FF0000"/>
+                </a:solidFill>
+              </a:rPr>
+              <a:t>RED</a:t>
+            </a:r>
+            <a:r>
               <a:rPr lang="en-US" dirty="0" smtClean="0"/>
-              <a:t>Allows you to make MULTIPLE versions of the same file to present</a:t>
+              <a:t>, which has already been approved (master)</a:t>
             </a:r>
           </a:p>
           <a:p>
             <a:pPr lvl="1"/>
             <a:r>
               <a:rPr lang="en-US" dirty="0" smtClean="0"/>
-              <a:t>Useful when you don’t have concrete ideas and need some room for creative freedom</a:t>
-            </a:r>
-          </a:p>
-          <a:p>
-            <a:endParaRPr lang="en-US" dirty="0" smtClean="0"/>
-          </a:p>
-          <a:p>
-            <a:endParaRPr lang="en-US" dirty="0" smtClean="0"/>
+              <a:t>You do the work…         Show the PM…</a:t>
+            </a:r>
+          </a:p>
+          <a:p>
+            <a:pPr lvl="1"/>
+            <a:r>
+              <a:rPr lang="en-US" dirty="0" smtClean="0"/>
+              <a:t>PM: “I think I like </a:t>
+            </a:r>
+            <a:r>
+              <a:rPr lang="en-US" dirty="0" smtClean="0">
+                <a:solidFill>
+                  <a:srgbClr val="996633"/>
+                </a:solidFill>
+              </a:rPr>
+              <a:t>BROWN</a:t>
+            </a:r>
+            <a:r>
+              <a:rPr lang="en-US" dirty="0" smtClean="0"/>
+              <a:t>, lets use that one”</a:t>
+            </a:r>
+          </a:p>
+          <a:p>
+            <a:pPr lvl="1"/>
+            <a:r>
+              <a:rPr lang="en-US" dirty="0" smtClean="0">
+                <a:solidFill>
+                  <a:srgbClr val="996633"/>
+                </a:solidFill>
+              </a:rPr>
+              <a:t>BROWN</a:t>
+            </a:r>
+            <a:r>
+              <a:rPr lang="en-US" dirty="0" smtClean="0"/>
+              <a:t> would then be merged (By management) into the (</a:t>
+            </a:r>
+            <a:r>
+              <a:rPr lang="en-US" dirty="0" smtClean="0">
+                <a:solidFill>
+                  <a:srgbClr val="FF0000"/>
+                </a:solidFill>
+              </a:rPr>
+              <a:t>RED</a:t>
+            </a:r>
+            <a:r>
+              <a:rPr lang="en-US" dirty="0" smtClean="0"/>
+              <a:t>) master repo, signaling approval. </a:t>
+            </a:r>
+          </a:p>
+          <a:p>
+            <a:pPr lvl="1"/>
+            <a:r>
+              <a:rPr lang="en-US" dirty="0" smtClean="0">
+                <a:solidFill>
+                  <a:srgbClr val="996633"/>
+                </a:solidFill>
+              </a:rPr>
+              <a:t>BROWN</a:t>
+            </a:r>
+            <a:r>
+              <a:rPr lang="en-US" dirty="0" smtClean="0"/>
+              <a:t> and </a:t>
+            </a:r>
+            <a:r>
+              <a:rPr lang="en-US" dirty="0" smtClean="0">
+                <a:solidFill>
+                  <a:srgbClr val="FF6600"/>
+                </a:solidFill>
+              </a:rPr>
+              <a:t>ORANGE</a:t>
+            </a:r>
+            <a:r>
+              <a:rPr lang="en-US" dirty="0" smtClean="0"/>
+              <a:t> branches could be deleted once the work is approved. (Optional)</a:t>
+            </a:r>
+          </a:p>
+          <a:p>
+            <a:pPr lvl="1"/>
+            <a:endParaRPr lang="en-US" dirty="0"/>
+          </a:p>
+          <a:p>
+            <a:endParaRPr lang="en-US" dirty="0"/>
           </a:p>
         </p:txBody>
       </p:sp>
       <p:pic>
         <p:nvPicPr>
-          <p:cNvPr id="4" name="Picture 3" descr="Screen Shot 2015-01-26 at 3.23.33 PM.png"/>
+          <p:cNvPr id="4" name="Picture 3" descr="Photoshop_CC_icon.png"/>
           <p:cNvPicPr>
             <a:picLocks noChangeAspect="1"/>
           </p:cNvPicPr>
@@ -10279,8 +10196,8 @@
         </p:blipFill>
         <p:spPr>
           <a:xfrm>
-            <a:off x="6569517" y="2842312"/>
-            <a:ext cx="2508820" cy="3780509"/>
+            <a:off x="3017201" y="4134696"/>
+            <a:ext cx="394187" cy="394187"/>
           </a:xfrm>
           <a:prstGeom prst="rect">
             <a:avLst/>
@@ -10290,7 +10207,7 @@
     </p:spTree>
     <p:extLst>
       <p:ext uri="{BB962C8B-B14F-4D97-AF65-F5344CB8AC3E}">
-        <p14:creationId xmlns:p14="http://schemas.microsoft.com/office/powerpoint/2010/main" val="1885091767"/>
+        <p14:creationId xmlns:p14="http://schemas.microsoft.com/office/powerpoint/2010/main" val="1202224775"/>
       </p:ext>
     </p:extLst>
   </p:cSld>

</xml_diff>

<commit_message>
There might be something cool
</commit_message>
<xml_diff>
--- a/Presentation.pptx
+++ b/Presentation.pptx
@@ -8503,8 +8503,8 @@
         </p:nvSpPr>
         <p:spPr>
           <a:xfrm>
-            <a:off x="-1" y="6290555"/>
-            <a:ext cx="5442857" cy="567445"/>
+            <a:off x="-1" y="5896429"/>
+            <a:ext cx="8953501" cy="961571"/>
           </a:xfrm>
           <a:prstGeom prst="rect">
             <a:avLst/>
@@ -8732,7 +8732,13 @@
             </a:r>
             <a:r>
               <a:rPr lang="en-US" dirty="0" smtClean="0"/>
-              <a:t>presentation!</a:t>
+              <a:t>presentation! </a:t>
+            </a:r>
+          </a:p>
+          <a:p>
+            <a:r>
+              <a:rPr lang="en-US" dirty="0" smtClean="0"/>
+              <a:t>There might be something cool if you check it out…</a:t>
             </a:r>
           </a:p>
           <a:p>

</xml_diff>

<commit_message>
I don't remember what this is D:
</commit_message>
<xml_diff>
--- a/Presentation.pptx
+++ b/Presentation.pptx
@@ -9081,17 +9081,40 @@
               <a:rPr lang="en-US" dirty="0" smtClean="0"/>
               <a:t>which create change history </a:t>
             </a:r>
-            <a:endParaRPr lang="en-US" b="1" dirty="0" smtClean="0">
-              <a:solidFill>
-                <a:srgbClr val="FF8000"/>
-              </a:solidFill>
-            </a:endParaRPr>
+            <a:endParaRPr lang="en-US" dirty="0" smtClean="0"/>
+          </a:p>
+          <a:p>
+            <a:pPr lvl="2"/>
+            <a:r>
+              <a:rPr lang="en-US" dirty="0" smtClean="0"/>
+              <a:t>Change = Additions + Deletions</a:t>
+            </a:r>
           </a:p>
           <a:p>
             <a:pPr lvl="1"/>
             <a:r>
               <a:rPr lang="en-US" dirty="0" smtClean="0"/>
-              <a:t>If two people are working on the same file, then can be automatically merged together and combine your work. Merging two peoples work creates a </a:t>
+              <a:t>If </a:t>
+            </a:r>
+            <a:r>
+              <a:rPr lang="en-US" dirty="0" smtClean="0"/>
+              <a:t>two people are working on the same file, </a:t>
+            </a:r>
+            <a:r>
+              <a:rPr lang="en-US" dirty="0" smtClean="0"/>
+              <a:t>the work can </a:t>
+            </a:r>
+            <a:r>
+              <a:rPr lang="en-US" dirty="0" smtClean="0"/>
+              <a:t>be automatically merged </a:t>
+            </a:r>
+            <a:r>
+              <a:rPr lang="en-US" dirty="0" smtClean="0"/>
+              <a:t>together. </a:t>
+            </a:r>
+            <a:r>
+              <a:rPr lang="en-US" dirty="0" smtClean="0"/>
+              <a:t>Merging two peoples work creates a </a:t>
             </a:r>
             <a:r>
               <a:rPr lang="en-US" b="1" dirty="0">
@@ -9107,11 +9130,7 @@
                   <a:srgbClr val="FF8000"/>
                 </a:solidFill>
               </a:rPr>
-              <a:t>erge commit</a:t>
-            </a:r>
-            <a:r>
-              <a:rPr lang="en-US" dirty="0" smtClean="0"/>
-              <a:t>, or a </a:t>
+              <a:t>erge </a:t>
             </a:r>
             <a:r>
               <a:rPr lang="en-US" b="1" dirty="0" smtClean="0">
@@ -9119,8 +9138,9 @@
                   <a:srgbClr val="FF8000"/>
                 </a:solidFill>
               </a:rPr>
-              <a:t>Pull Request</a:t>
-            </a:r>
+              <a:t>commit</a:t>
+            </a:r>
+            <a:endParaRPr lang="en-US" dirty="0"/>
           </a:p>
           <a:p>
             <a:pPr lvl="1"/>
@@ -9130,12 +9150,13 @@
                   <a:srgbClr val="FF8000"/>
                 </a:solidFill>
               </a:rPr>
-              <a:t>Pull Requests</a:t>
+              <a:t>Pull Requests (PR)</a:t>
             </a:r>
             <a:r>
               <a:rPr lang="en-US" dirty="0" smtClean="0"/>
-              <a:t> create an authority chain, to denote approving assets</a:t>
-            </a:r>
+              <a:t> are a request for approval from your manager. Once they accept the Pull Request, the work is considered complete.</a:t>
+            </a:r>
+            <a:endParaRPr lang="en-US" dirty="0" smtClean="0"/>
           </a:p>
           <a:p>
             <a:pPr lvl="1"/>
@@ -9279,8 +9300,31 @@
             </a:r>
             <a:r>
               <a:rPr lang="en-US" dirty="0" smtClean="0"/>
-              <a:t>awesome for designers.</a:t>
-            </a:r>
+              <a:t>awesome for designers</a:t>
+            </a:r>
+            <a:r>
+              <a:rPr lang="en-US" dirty="0" smtClean="0"/>
+              <a:t>.</a:t>
+            </a:r>
+          </a:p>
+          <a:p>
+            <a:r>
+              <a:rPr lang="en-US" dirty="0" smtClean="0"/>
+              <a:t>You can access it at: </a:t>
+            </a:r>
+            <a:r>
+              <a:rPr lang="en-US" dirty="0" smtClean="0">
+                <a:hlinkClick r:id="rId2"/>
+              </a:rPr>
+              <a:t>http://github.com</a:t>
+            </a:r>
+            <a:r>
+              <a:rPr lang="en-US" dirty="0" smtClean="0"/>
+              <a:t> 	 </a:t>
+            </a:r>
+          </a:p>
+          <a:p>
+            <a:endParaRPr lang="en-US" dirty="0" smtClean="0"/>
           </a:p>
           <a:p>
             <a:pPr marL="0" indent="0">
@@ -9723,7 +9767,33 @@
           <a:p>
             <a:r>
               <a:rPr lang="en-US" dirty="0" smtClean="0"/>
-              <a:t>History is attached to your name, so we can see who did what work.</a:t>
+              <a:t>History is attached to your name, so we can see who did what </a:t>
+            </a:r>
+            <a:r>
+              <a:rPr lang="en-US" dirty="0" smtClean="0"/>
+              <a:t>work</a:t>
+            </a:r>
+          </a:p>
+          <a:p>
+            <a:pPr lvl="1"/>
+            <a:r>
+              <a:rPr lang="en-US" dirty="0" smtClean="0"/>
+              <a:t>Don’t be paranoid </a:t>
+            </a:r>
+            <a:r>
+              <a:rPr lang="en-US" dirty="0" smtClean="0">
+                <a:sym typeface="Wingdings"/>
+              </a:rPr>
+              <a:t> </a:t>
+            </a:r>
+          </a:p>
+          <a:p>
+            <a:pPr lvl="1"/>
+            <a:r>
+              <a:rPr lang="en-US" dirty="0" smtClean="0">
+                <a:sym typeface="Wingdings"/>
+              </a:rPr>
+              <a:t>Attribution is good</a:t>
             </a:r>
             <a:endParaRPr lang="en-US" dirty="0"/>
           </a:p>

</xml_diff>